<commit_message>
Added testing overview to Testing.pptx
</commit_message>
<xml_diff>
--- a/Documentation/Testing.pptx
+++ b/Documentation/Testing.pptx
@@ -5,10 +5,11 @@
     <p:sldMasterId id="2147483648" r:id="rId1"/>
   </p:sldMasterIdLst>
   <p:sldIdLst>
-    <p:sldId id="257" r:id="rId2"/>
-    <p:sldId id="259" r:id="rId3"/>
-    <p:sldId id="256" r:id="rId4"/>
-    <p:sldId id="258" r:id="rId5"/>
+    <p:sldId id="260" r:id="rId2"/>
+    <p:sldId id="257" r:id="rId3"/>
+    <p:sldId id="259" r:id="rId4"/>
+    <p:sldId id="256" r:id="rId5"/>
+    <p:sldId id="258" r:id="rId6"/>
   </p:sldIdLst>
   <p:sldSz cx="12192000" cy="6858000"/>
   <p:notesSz cx="6858000" cy="9144000"/>
@@ -262,7 +263,7 @@
           <a:p>
             <a:fld id="{EDB57DFE-C7BB-4F07-89E0-B43CB47ADEB3}" type="datetimeFigureOut">
               <a:rPr lang="en-US" smtClean="0"/>
-              <a:t>6/13/2021</a:t>
+              <a:t>6/15/2021</a:t>
             </a:fld>
             <a:endParaRPr lang="en-US"/>
           </a:p>
@@ -460,7 +461,7 @@
           <a:p>
             <a:fld id="{EDB57DFE-C7BB-4F07-89E0-B43CB47ADEB3}" type="datetimeFigureOut">
               <a:rPr lang="en-US" smtClean="0"/>
-              <a:t>6/13/2021</a:t>
+              <a:t>6/15/2021</a:t>
             </a:fld>
             <a:endParaRPr lang="en-US"/>
           </a:p>
@@ -668,7 +669,7 @@
           <a:p>
             <a:fld id="{EDB57DFE-C7BB-4F07-89E0-B43CB47ADEB3}" type="datetimeFigureOut">
               <a:rPr lang="en-US" smtClean="0"/>
-              <a:t>6/13/2021</a:t>
+              <a:t>6/15/2021</a:t>
             </a:fld>
             <a:endParaRPr lang="en-US"/>
           </a:p>
@@ -866,7 +867,7 @@
           <a:p>
             <a:fld id="{EDB57DFE-C7BB-4F07-89E0-B43CB47ADEB3}" type="datetimeFigureOut">
               <a:rPr lang="en-US" smtClean="0"/>
-              <a:t>6/13/2021</a:t>
+              <a:t>6/15/2021</a:t>
             </a:fld>
             <a:endParaRPr lang="en-US"/>
           </a:p>
@@ -1141,7 +1142,7 @@
           <a:p>
             <a:fld id="{EDB57DFE-C7BB-4F07-89E0-B43CB47ADEB3}" type="datetimeFigureOut">
               <a:rPr lang="en-US" smtClean="0"/>
-              <a:t>6/13/2021</a:t>
+              <a:t>6/15/2021</a:t>
             </a:fld>
             <a:endParaRPr lang="en-US"/>
           </a:p>
@@ -1406,7 +1407,7 @@
           <a:p>
             <a:fld id="{EDB57DFE-C7BB-4F07-89E0-B43CB47ADEB3}" type="datetimeFigureOut">
               <a:rPr lang="en-US" smtClean="0"/>
-              <a:t>6/13/2021</a:t>
+              <a:t>6/15/2021</a:t>
             </a:fld>
             <a:endParaRPr lang="en-US"/>
           </a:p>
@@ -1818,7 +1819,7 @@
           <a:p>
             <a:fld id="{EDB57DFE-C7BB-4F07-89E0-B43CB47ADEB3}" type="datetimeFigureOut">
               <a:rPr lang="en-US" smtClean="0"/>
-              <a:t>6/13/2021</a:t>
+              <a:t>6/15/2021</a:t>
             </a:fld>
             <a:endParaRPr lang="en-US"/>
           </a:p>
@@ -1959,7 +1960,7 @@
           <a:p>
             <a:fld id="{EDB57DFE-C7BB-4F07-89E0-B43CB47ADEB3}" type="datetimeFigureOut">
               <a:rPr lang="en-US" smtClean="0"/>
-              <a:t>6/13/2021</a:t>
+              <a:t>6/15/2021</a:t>
             </a:fld>
             <a:endParaRPr lang="en-US"/>
           </a:p>
@@ -2072,7 +2073,7 @@
           <a:p>
             <a:fld id="{EDB57DFE-C7BB-4F07-89E0-B43CB47ADEB3}" type="datetimeFigureOut">
               <a:rPr lang="en-US" smtClean="0"/>
-              <a:t>6/13/2021</a:t>
+              <a:t>6/15/2021</a:t>
             </a:fld>
             <a:endParaRPr lang="en-US"/>
           </a:p>
@@ -2383,7 +2384,7 @@
           <a:p>
             <a:fld id="{EDB57DFE-C7BB-4F07-89E0-B43CB47ADEB3}" type="datetimeFigureOut">
               <a:rPr lang="en-US" smtClean="0"/>
-              <a:t>6/13/2021</a:t>
+              <a:t>6/15/2021</a:t>
             </a:fld>
             <a:endParaRPr lang="en-US"/>
           </a:p>
@@ -2671,7 +2672,7 @@
           <a:p>
             <a:fld id="{EDB57DFE-C7BB-4F07-89E0-B43CB47ADEB3}" type="datetimeFigureOut">
               <a:rPr lang="en-US" smtClean="0"/>
-              <a:t>6/13/2021</a:t>
+              <a:t>6/15/2021</a:t>
             </a:fld>
             <a:endParaRPr lang="en-US"/>
           </a:p>
@@ -2912,7 +2913,7 @@
           <a:p>
             <a:fld id="{EDB57DFE-C7BB-4F07-89E0-B43CB47ADEB3}" type="datetimeFigureOut">
               <a:rPr lang="en-US" smtClean="0"/>
-              <a:t>6/13/2021</a:t>
+              <a:t>6/15/2021</a:t>
             </a:fld>
             <a:endParaRPr lang="en-US"/>
           </a:p>
@@ -3331,22 +3332,166 @@
       </p:grpSpPr>
       <p:sp>
         <p:nvSpPr>
-          <p:cNvPr id="5" name="Isosceles Triangle 4">
-            <a:extLst>
-              <a:ext uri="{FF2B5EF4-FFF2-40B4-BE49-F238E27FC236}">
-                <a16:creationId xmlns:a16="http://schemas.microsoft.com/office/drawing/2014/main" id="{F6FF05A0-A1B6-4816-A570-59A9A90AAB11}"/>
-              </a:ext>
-            </a:extLst>
-          </p:cNvPr>
+          <p:cNvPr id="4" name="TextBox 3"/>
+          <p:cNvSpPr txBox="1"/>
+          <p:nvPr/>
+        </p:nvSpPr>
+        <p:spPr>
+          <a:xfrm>
+            <a:off x="479394" y="1580225"/>
+            <a:ext cx="7261155" cy="2031325"/>
+          </a:xfrm>
+          <a:prstGeom prst="rect">
+            <a:avLst/>
+          </a:prstGeom>
+          <a:noFill/>
+        </p:spPr>
+        <p:txBody>
+          <a:bodyPr wrap="none" rtlCol="0">
+            <a:spAutoFit/>
+          </a:bodyPr>
+          <a:lstStyle/>
+          <a:p>
+            <a:r>
+              <a:rPr lang="en-US" dirty="0" smtClean="0"/>
+              <a:t>Tests provide value when they fail.</a:t>
+            </a:r>
+            <a:br>
+              <a:rPr lang="en-US" dirty="0" smtClean="0"/>
+            </a:br>
+            <a:r>
+              <a:rPr lang="en-US" dirty="0" smtClean="0"/>
+              <a:t>Tests provide value when they pass in a reliable manner.</a:t>
+            </a:r>
+            <a:br>
+              <a:rPr lang="en-US" dirty="0" smtClean="0"/>
+            </a:br>
+            <a:r>
+              <a:rPr lang="en-US" dirty="0" smtClean="0"/>
+              <a:t>Tests provide value when they guard against bugs – find a bug write a test.</a:t>
+            </a:r>
+          </a:p>
+          <a:p>
+            <a:r>
+              <a:rPr lang="en-US" dirty="0" smtClean="0"/>
+              <a:t>Tests provide value when they run in an automated fashion – CICD pipeline.</a:t>
+            </a:r>
+            <a:br>
+              <a:rPr lang="en-US" dirty="0" smtClean="0"/>
+            </a:br>
+            <a:r>
+              <a:rPr lang="en-US" dirty="0" smtClean="0"/>
+              <a:t/>
+            </a:r>
+            <a:br>
+              <a:rPr lang="en-US" dirty="0" smtClean="0"/>
+            </a:br>
+            <a:r>
+              <a:rPr lang="en-US" b="1" dirty="0" smtClean="0"/>
+              <a:t>Tests provide value as they give confidence.</a:t>
+            </a:r>
+          </a:p>
+          <a:p>
+            <a:endParaRPr lang="en-US" dirty="0"/>
+          </a:p>
+        </p:txBody>
+      </p:sp>
+      <p:sp>
+        <p:nvSpPr>
+          <p:cNvPr id="5" name="TextBox 4"/>
+          <p:cNvSpPr txBox="1"/>
+          <p:nvPr/>
+        </p:nvSpPr>
+        <p:spPr>
+          <a:xfrm>
+            <a:off x="479394" y="4117188"/>
+            <a:ext cx="10315853" cy="369332"/>
+          </a:xfrm>
+          <a:prstGeom prst="rect">
+            <a:avLst/>
+          </a:prstGeom>
+          <a:noFill/>
+        </p:spPr>
+        <p:txBody>
+          <a:bodyPr wrap="square" rtlCol="0">
+            <a:spAutoFit/>
+          </a:bodyPr>
+          <a:lstStyle/>
+          <a:p>
+            <a:r>
+              <a:rPr lang="en-US" dirty="0" smtClean="0"/>
+              <a:t>Not all tests are created equal and need to be grouped, by when and where you run them.</a:t>
+            </a:r>
+          </a:p>
+        </p:txBody>
+      </p:sp>
+      <p:sp>
+        <p:nvSpPr>
+          <p:cNvPr id="6" name="Rectangle 5"/>
           <p:cNvSpPr/>
           <p:nvPr/>
         </p:nvSpPr>
         <p:spPr>
           <a:xfrm>
-            <a:off x="3162650" y="1149292"/>
-            <a:ext cx="5620624" cy="4845366"/>
-          </a:xfrm>
-          <a:prstGeom prst="triangle">
+            <a:off x="324932" y="151232"/>
+            <a:ext cx="2149564" cy="923330"/>
+          </a:xfrm>
+          <a:prstGeom prst="rect">
+            <a:avLst/>
+          </a:prstGeom>
+          <a:noFill/>
+        </p:spPr>
+        <p:txBody>
+          <a:bodyPr wrap="none" lIns="91440" tIns="45720" rIns="91440" bIns="45720">
+            <a:spAutoFit/>
+          </a:bodyPr>
+          <a:lstStyle/>
+          <a:p>
+            <a:pPr algn="ctr"/>
+            <a:r>
+              <a:rPr lang="en-US" sz="5400" b="0" cap="none" spc="0" dirty="0" smtClean="0">
+                <a:ln w="0"/>
+                <a:solidFill>
+                  <a:schemeClr val="tx1"/>
+                </a:solidFill>
+                <a:effectLst>
+                  <a:outerShdw blurRad="38100" dist="19050" dir="2700000" algn="tl" rotWithShape="0">
+                    <a:schemeClr val="dk1">
+                      <a:alpha val="40000"/>
+                    </a:schemeClr>
+                  </a:outerShdw>
+                </a:effectLst>
+              </a:rPr>
+              <a:t>Testing</a:t>
+            </a:r>
+            <a:endParaRPr lang="en-US" sz="5400" b="0" cap="none" spc="0" dirty="0">
+              <a:ln w="0"/>
+              <a:solidFill>
+                <a:schemeClr val="tx1"/>
+              </a:solidFill>
+              <a:effectLst>
+                <a:outerShdw blurRad="38100" dist="19050" dir="2700000" algn="tl" rotWithShape="0">
+                  <a:schemeClr val="dk1">
+                    <a:alpha val="40000"/>
+                  </a:schemeClr>
+                </a:outerShdw>
+              </a:effectLst>
+            </a:endParaRPr>
+          </a:p>
+        </p:txBody>
+      </p:sp>
+      <p:sp>
+        <p:nvSpPr>
+          <p:cNvPr id="7" name="Rectangle 6"/>
+          <p:cNvSpPr/>
+          <p:nvPr/>
+        </p:nvSpPr>
+        <p:spPr>
+          <a:xfrm>
+            <a:off x="1199966" y="5003333"/>
+            <a:ext cx="1518081" cy="585926"/>
+          </a:xfrm>
+          <a:prstGeom prst="rect">
             <a:avLst/>
           </a:prstGeom>
         </p:spPr>
@@ -3371,558 +3516,244 @@
           <a:lstStyle/>
           <a:p>
             <a:pPr algn="ctr"/>
-            <a:endParaRPr lang="en-US"/>
-          </a:p>
-        </p:txBody>
-      </p:sp>
-      <p:sp>
-        <p:nvSpPr>
-          <p:cNvPr id="6" name="TextBox 5">
-            <a:extLst>
-              <a:ext uri="{FF2B5EF4-FFF2-40B4-BE49-F238E27FC236}">
-                <a16:creationId xmlns:a16="http://schemas.microsoft.com/office/drawing/2014/main" id="{8B974FEC-4E86-459C-9FB4-EAD331D30D04}"/>
-              </a:ext>
-            </a:extLst>
-          </p:cNvPr>
-          <p:cNvSpPr txBox="1"/>
-          <p:nvPr/>
-        </p:nvSpPr>
-        <p:spPr>
-          <a:xfrm>
-            <a:off x="3158455" y="5440660"/>
-            <a:ext cx="5620623" cy="369332"/>
+            <a:r>
+              <a:rPr lang="en-US" dirty="0" smtClean="0"/>
+              <a:t>Unit</a:t>
+            </a:r>
+            <a:endParaRPr lang="en-US" dirty="0"/>
+          </a:p>
+        </p:txBody>
+      </p:sp>
+      <p:sp>
+        <p:nvSpPr>
+          <p:cNvPr id="8" name="Rectangle 7"/>
+          <p:cNvSpPr/>
+          <p:nvPr/>
+        </p:nvSpPr>
+        <p:spPr>
+          <a:xfrm>
+            <a:off x="3151183" y="5003333"/>
+            <a:ext cx="1518081" cy="585926"/>
           </a:xfrm>
           <a:prstGeom prst="rect">
             <a:avLst/>
           </a:prstGeom>
-          <a:noFill/>
-        </p:spPr>
-        <p:txBody>
-          <a:bodyPr wrap="square" rtlCol="0">
-            <a:spAutoFit/>
-          </a:bodyPr>
-          <a:lstStyle/>
-          <a:p>
-            <a:pPr algn="ctr"/>
-            <a:r>
-              <a:rPr lang="en-US" dirty="0"/>
-              <a:t>Unit</a:t>
-            </a:r>
-          </a:p>
-        </p:txBody>
-      </p:sp>
-      <p:sp>
-        <p:nvSpPr>
-          <p:cNvPr id="7" name="TextBox 6">
-            <a:extLst>
-              <a:ext uri="{FF2B5EF4-FFF2-40B4-BE49-F238E27FC236}">
-                <a16:creationId xmlns:a16="http://schemas.microsoft.com/office/drawing/2014/main" id="{B1329BB2-4A29-44B9-A05A-3EEA173ACA8A}"/>
-              </a:ext>
-            </a:extLst>
-          </p:cNvPr>
-          <p:cNvSpPr txBox="1"/>
-          <p:nvPr/>
-        </p:nvSpPr>
-        <p:spPr>
-          <a:xfrm>
-            <a:off x="3162647" y="4611476"/>
-            <a:ext cx="5620623" cy="369332"/>
-          </a:xfrm>
-          <a:prstGeom prst="rect">
-            <a:avLst/>
-          </a:prstGeom>
-          <a:noFill/>
-        </p:spPr>
-        <p:txBody>
-          <a:bodyPr wrap="square" rtlCol="0">
-            <a:spAutoFit/>
-          </a:bodyPr>
-          <a:lstStyle/>
-          <a:p>
-            <a:pPr algn="ctr"/>
-            <a:r>
-              <a:rPr lang="en-US" dirty="0"/>
-              <a:t>Integration</a:t>
-            </a:r>
-          </a:p>
-        </p:txBody>
-      </p:sp>
-      <p:sp>
-        <p:nvSpPr>
-          <p:cNvPr id="8" name="TextBox 7">
-            <a:extLst>
-              <a:ext uri="{FF2B5EF4-FFF2-40B4-BE49-F238E27FC236}">
-                <a16:creationId xmlns:a16="http://schemas.microsoft.com/office/drawing/2014/main" id="{B4C40372-3301-4408-9995-D1033570A64E}"/>
-              </a:ext>
-            </a:extLst>
-          </p:cNvPr>
-          <p:cNvSpPr txBox="1"/>
-          <p:nvPr/>
-        </p:nvSpPr>
-        <p:spPr>
-          <a:xfrm>
-            <a:off x="3162643" y="3597626"/>
-            <a:ext cx="5620623" cy="369332"/>
-          </a:xfrm>
-          <a:prstGeom prst="rect">
-            <a:avLst/>
-          </a:prstGeom>
-          <a:noFill/>
-        </p:spPr>
-        <p:txBody>
-          <a:bodyPr wrap="square" rtlCol="0">
-            <a:spAutoFit/>
-          </a:bodyPr>
-          <a:lstStyle/>
-          <a:p>
-            <a:pPr algn="ctr"/>
-            <a:r>
-              <a:rPr lang="en-US" dirty="0"/>
-              <a:t>Smoke / Functional</a:t>
-            </a:r>
-          </a:p>
-        </p:txBody>
-      </p:sp>
-      <p:sp>
-        <p:nvSpPr>
-          <p:cNvPr id="9" name="TextBox 8">
-            <a:extLst>
-              <a:ext uri="{FF2B5EF4-FFF2-40B4-BE49-F238E27FC236}">
-                <a16:creationId xmlns:a16="http://schemas.microsoft.com/office/drawing/2014/main" id="{316653F4-3D2C-43D6-91C5-F563A73034A5}"/>
-              </a:ext>
-            </a:extLst>
-          </p:cNvPr>
-          <p:cNvSpPr txBox="1"/>
-          <p:nvPr/>
-        </p:nvSpPr>
-        <p:spPr>
-          <a:xfrm>
-            <a:off x="3162643" y="2583776"/>
-            <a:ext cx="5620623" cy="369332"/>
-          </a:xfrm>
-          <a:prstGeom prst="rect">
-            <a:avLst/>
-          </a:prstGeom>
-          <a:noFill/>
-        </p:spPr>
-        <p:txBody>
-          <a:bodyPr wrap="square" rtlCol="0">
-            <a:spAutoFit/>
-          </a:bodyPr>
-          <a:lstStyle/>
-          <a:p>
-            <a:pPr algn="ctr"/>
-            <a:r>
-              <a:rPr lang="en-US" dirty="0"/>
-              <a:t>End to End</a:t>
-            </a:r>
-          </a:p>
-        </p:txBody>
-      </p:sp>
-      <p:cxnSp>
-        <p:nvCxnSpPr>
-          <p:cNvPr id="11" name="Straight Connector 10">
-            <a:extLst>
-              <a:ext uri="{FF2B5EF4-FFF2-40B4-BE49-F238E27FC236}">
-                <a16:creationId xmlns:a16="http://schemas.microsoft.com/office/drawing/2014/main" id="{7AF566BC-5FE6-4368-B70A-5DC90DCB1869}"/>
-              </a:ext>
-            </a:extLst>
-          </p:cNvPr>
-          <p:cNvCxnSpPr>
-            <a:cxnSpLocks/>
-          </p:cNvCxnSpPr>
-          <p:nvPr/>
-        </p:nvCxnSpPr>
-        <p:spPr>
-          <a:xfrm>
-            <a:off x="4781725" y="3179428"/>
-            <a:ext cx="2374084" cy="0"/>
-          </a:xfrm>
-          <a:prstGeom prst="line">
-            <a:avLst/>
-          </a:prstGeom>
         </p:spPr>
         <p:style>
-          <a:lnRef idx="1">
-            <a:schemeClr val="dk1"/>
+          <a:lnRef idx="2">
+            <a:schemeClr val="accent1">
+              <a:shade val="50000"/>
+            </a:schemeClr>
           </a:lnRef>
-          <a:fillRef idx="0">
-            <a:schemeClr val="dk1"/>
-          </a:fillRef>
-          <a:effectRef idx="0">
-            <a:schemeClr val="dk1"/>
-          </a:effectRef>
-          <a:fontRef idx="minor">
-            <a:schemeClr val="tx1"/>
-          </a:fontRef>
-        </p:style>
-      </p:cxnSp>
-      <p:cxnSp>
-        <p:nvCxnSpPr>
-          <p:cNvPr id="13" name="Straight Connector 12">
-            <a:extLst>
-              <a:ext uri="{FF2B5EF4-FFF2-40B4-BE49-F238E27FC236}">
-                <a16:creationId xmlns:a16="http://schemas.microsoft.com/office/drawing/2014/main" id="{4A4F126B-9EDE-42B0-97AF-96644BBB41C1}"/>
-              </a:ext>
-            </a:extLst>
-          </p:cNvPr>
-          <p:cNvCxnSpPr>
-            <a:cxnSpLocks/>
-          </p:cNvCxnSpPr>
-          <p:nvPr/>
-        </p:nvCxnSpPr>
-        <p:spPr>
-          <a:xfrm>
-            <a:off x="4110606" y="4328719"/>
-            <a:ext cx="3716322" cy="0"/>
-          </a:xfrm>
-          <a:prstGeom prst="line">
-            <a:avLst/>
-          </a:prstGeom>
-        </p:spPr>
-        <p:style>
-          <a:lnRef idx="1">
-            <a:schemeClr val="dk1"/>
-          </a:lnRef>
-          <a:fillRef idx="0">
-            <a:schemeClr val="dk1"/>
-          </a:fillRef>
-          <a:effectRef idx="0">
-            <a:schemeClr val="dk1"/>
-          </a:effectRef>
-          <a:fontRef idx="minor">
-            <a:schemeClr val="tx1"/>
-          </a:fontRef>
-        </p:style>
-      </p:cxnSp>
-      <p:cxnSp>
-        <p:nvCxnSpPr>
-          <p:cNvPr id="14" name="Straight Connector 13">
-            <a:extLst>
-              <a:ext uri="{FF2B5EF4-FFF2-40B4-BE49-F238E27FC236}">
-                <a16:creationId xmlns:a16="http://schemas.microsoft.com/office/drawing/2014/main" id="{2085C0C7-73B7-406D-80E4-99BE5B682DFA}"/>
-              </a:ext>
-            </a:extLst>
-          </p:cNvPr>
-          <p:cNvCxnSpPr>
-            <a:cxnSpLocks/>
-          </p:cNvCxnSpPr>
-          <p:nvPr/>
-        </p:nvCxnSpPr>
-        <p:spPr>
-          <a:xfrm>
-            <a:off x="3556932" y="5310231"/>
-            <a:ext cx="4848837" cy="0"/>
-          </a:xfrm>
-          <a:prstGeom prst="line">
-            <a:avLst/>
-          </a:prstGeom>
-        </p:spPr>
-        <p:style>
-          <a:lnRef idx="1">
-            <a:schemeClr val="dk1"/>
-          </a:lnRef>
-          <a:fillRef idx="0">
-            <a:schemeClr val="dk1"/>
-          </a:fillRef>
-          <a:effectRef idx="0">
-            <a:schemeClr val="dk1"/>
-          </a:effectRef>
-          <a:fontRef idx="minor">
-            <a:schemeClr val="tx1"/>
-          </a:fontRef>
-        </p:style>
-      </p:cxnSp>
-      <p:cxnSp>
-        <p:nvCxnSpPr>
-          <p:cNvPr id="25" name="Straight Arrow Connector 24">
-            <a:extLst>
-              <a:ext uri="{FF2B5EF4-FFF2-40B4-BE49-F238E27FC236}">
-                <a16:creationId xmlns:a16="http://schemas.microsoft.com/office/drawing/2014/main" id="{738B7F89-1801-47CC-9CE2-5230E0A30AF1}"/>
-              </a:ext>
-            </a:extLst>
-          </p:cNvPr>
-          <p:cNvCxnSpPr>
-            <a:cxnSpLocks/>
-          </p:cNvCxnSpPr>
-          <p:nvPr/>
-        </p:nvCxnSpPr>
-        <p:spPr>
-          <a:xfrm>
-            <a:off x="1174459" y="1006895"/>
-            <a:ext cx="0" cy="4987763"/>
-          </a:xfrm>
-          <a:prstGeom prst="straightConnector1">
-            <a:avLst/>
-          </a:prstGeom>
-          <a:ln w="76200">
-            <a:headEnd type="triangle" w="med" len="med"/>
-            <a:tailEnd type="triangle" w="med" len="med"/>
-          </a:ln>
-        </p:spPr>
-        <p:style>
-          <a:lnRef idx="1">
-            <a:schemeClr val="accent1"/>
-          </a:lnRef>
-          <a:fillRef idx="0">
+          <a:fillRef idx="1">
             <a:schemeClr val="accent1"/>
           </a:fillRef>
           <a:effectRef idx="0">
             <a:schemeClr val="accent1"/>
           </a:effectRef>
           <a:fontRef idx="minor">
-            <a:schemeClr val="tx1"/>
+            <a:schemeClr val="lt1"/>
           </a:fontRef>
         </p:style>
-      </p:cxnSp>
-      <p:sp>
-        <p:nvSpPr>
-          <p:cNvPr id="26" name="TextBox 25">
-            <a:extLst>
-              <a:ext uri="{FF2B5EF4-FFF2-40B4-BE49-F238E27FC236}">
-                <a16:creationId xmlns:a16="http://schemas.microsoft.com/office/drawing/2014/main" id="{FE8D1872-FFCD-4BDC-B226-B1C1C4726E7A}"/>
-              </a:ext>
-            </a:extLst>
-          </p:cNvPr>
-          <p:cNvSpPr txBox="1"/>
-          <p:nvPr/>
-        </p:nvSpPr>
-        <p:spPr>
-          <a:xfrm>
-            <a:off x="1325459" y="969761"/>
-            <a:ext cx="2323751" cy="1200329"/>
+        <p:txBody>
+          <a:bodyPr rtlCol="0" anchor="ctr"/>
+          <a:lstStyle/>
+          <a:p>
+            <a:pPr algn="ctr"/>
+            <a:r>
+              <a:rPr lang="en-US" dirty="0" smtClean="0"/>
+              <a:t>Integration</a:t>
+            </a:r>
+            <a:endParaRPr lang="en-US" dirty="0"/>
+          </a:p>
+        </p:txBody>
+      </p:sp>
+      <p:sp>
+        <p:nvSpPr>
+          <p:cNvPr id="9" name="Rectangle 8"/>
+          <p:cNvSpPr/>
+          <p:nvPr/>
+        </p:nvSpPr>
+        <p:spPr>
+          <a:xfrm>
+            <a:off x="6171756" y="5797120"/>
+            <a:ext cx="1518081" cy="585926"/>
           </a:xfrm>
           <a:prstGeom prst="rect">
             <a:avLst/>
           </a:prstGeom>
-          <a:noFill/>
-        </p:spPr>
-        <p:txBody>
-          <a:bodyPr wrap="square" rtlCol="0">
-            <a:spAutoFit/>
-          </a:bodyPr>
-          <a:lstStyle/>
-          <a:p>
-            <a:r>
-              <a:rPr lang="en-US" dirty="0"/>
-              <a:t>Fewer Test</a:t>
-            </a:r>
-            <a:br>
-              <a:rPr lang="en-US" dirty="0"/>
-            </a:br>
-            <a:r>
-              <a:rPr lang="en-US" dirty="0"/>
-              <a:t>More Integration</a:t>
-            </a:r>
-            <a:br>
-              <a:rPr lang="en-US" dirty="0"/>
-            </a:br>
-            <a:r>
-              <a:rPr lang="en-US" dirty="0"/>
-              <a:t>Slower</a:t>
-            </a:r>
-            <a:br>
-              <a:rPr lang="en-US" dirty="0"/>
-            </a:br>
-            <a:r>
-              <a:rPr lang="en-US" dirty="0"/>
-              <a:t>More Brittle</a:t>
-            </a:r>
-          </a:p>
-        </p:txBody>
-      </p:sp>
-      <p:sp>
-        <p:nvSpPr>
-          <p:cNvPr id="27" name="TextBox 26">
-            <a:extLst>
-              <a:ext uri="{FF2B5EF4-FFF2-40B4-BE49-F238E27FC236}">
-                <a16:creationId xmlns:a16="http://schemas.microsoft.com/office/drawing/2014/main" id="{D9634973-B829-4BBC-9221-894BBDD08936}"/>
-              </a:ext>
-            </a:extLst>
-          </p:cNvPr>
-          <p:cNvSpPr txBox="1"/>
-          <p:nvPr/>
-        </p:nvSpPr>
-        <p:spPr>
-          <a:xfrm>
-            <a:off x="1325460" y="4796142"/>
-            <a:ext cx="1686191" cy="1200329"/>
-          </a:xfrm>
-          <a:prstGeom prst="rect">
-            <a:avLst/>
-          </a:prstGeom>
-          <a:noFill/>
-        </p:spPr>
-        <p:txBody>
-          <a:bodyPr wrap="square" rtlCol="0">
-            <a:spAutoFit/>
-          </a:bodyPr>
-          <a:lstStyle/>
-          <a:p>
-            <a:r>
-              <a:rPr lang="en-US" dirty="0"/>
-              <a:t>More Test</a:t>
-            </a:r>
-            <a:br>
-              <a:rPr lang="en-US" dirty="0"/>
-            </a:br>
-            <a:r>
-              <a:rPr lang="en-US" dirty="0"/>
-              <a:t>More Isolation</a:t>
-            </a:r>
-            <a:br>
-              <a:rPr lang="en-US" dirty="0"/>
-            </a:br>
-            <a:r>
-              <a:rPr lang="en-US" dirty="0"/>
-              <a:t>Faster</a:t>
-            </a:r>
-            <a:br>
-              <a:rPr lang="en-US" dirty="0"/>
-            </a:br>
-            <a:r>
-              <a:rPr lang="en-US" dirty="0"/>
-              <a:t>Stable</a:t>
-            </a:r>
-          </a:p>
-        </p:txBody>
-      </p:sp>
-      <p:sp>
-        <p:nvSpPr>
-          <p:cNvPr id="30" name="TextBox 29">
-            <a:extLst>
-              <a:ext uri="{FF2B5EF4-FFF2-40B4-BE49-F238E27FC236}">
-                <a16:creationId xmlns:a16="http://schemas.microsoft.com/office/drawing/2014/main" id="{C3E77BDC-953A-4293-B2FB-0E7B0FB08133}"/>
-              </a:ext>
-            </a:extLst>
-          </p:cNvPr>
-          <p:cNvSpPr txBox="1"/>
-          <p:nvPr/>
-        </p:nvSpPr>
-        <p:spPr>
-          <a:xfrm>
-            <a:off x="3162643" y="386196"/>
-            <a:ext cx="5620623" cy="646331"/>
-          </a:xfrm>
-          <a:prstGeom prst="rect">
-            <a:avLst/>
-          </a:prstGeom>
-          <a:noFill/>
-        </p:spPr>
-        <p:txBody>
-          <a:bodyPr wrap="square" rtlCol="0">
-            <a:spAutoFit/>
-          </a:bodyPr>
-          <a:lstStyle/>
-          <a:p>
-            <a:pPr algn="ctr"/>
-            <a:r>
-              <a:rPr lang="en-US" sz="3600" b="1" dirty="0"/>
-              <a:t>Testing Pyramid</a:t>
-            </a:r>
-          </a:p>
-        </p:txBody>
-      </p:sp>
-      <p:cxnSp>
-        <p:nvCxnSpPr>
-          <p:cNvPr id="15" name="Straight Arrow Connector 14">
-            <a:extLst>
-              <a:ext uri="{FF2B5EF4-FFF2-40B4-BE49-F238E27FC236}">
-                <a16:creationId xmlns:a16="http://schemas.microsoft.com/office/drawing/2014/main" id="{4E71C545-BFC9-4D09-93B5-2E74F62C49D9}"/>
-              </a:ext>
-            </a:extLst>
-          </p:cNvPr>
-          <p:cNvCxnSpPr>
-            <a:cxnSpLocks/>
-          </p:cNvCxnSpPr>
-          <p:nvPr/>
-        </p:nvCxnSpPr>
-        <p:spPr>
-          <a:xfrm>
-            <a:off x="9473868" y="4328719"/>
-            <a:ext cx="0" cy="1628805"/>
-          </a:xfrm>
-          <a:prstGeom prst="straightConnector1">
-            <a:avLst/>
-          </a:prstGeom>
-          <a:ln w="76200">
-            <a:headEnd type="triangle" w="med" len="med"/>
-            <a:tailEnd type="triangle" w="med" len="med"/>
-          </a:ln>
         </p:spPr>
         <p:style>
-          <a:lnRef idx="1">
-            <a:schemeClr val="accent1"/>
+          <a:lnRef idx="2">
+            <a:schemeClr val="accent1">
+              <a:shade val="50000"/>
+            </a:schemeClr>
           </a:lnRef>
-          <a:fillRef idx="0">
+          <a:fillRef idx="1">
             <a:schemeClr val="accent1"/>
           </a:fillRef>
           <a:effectRef idx="0">
             <a:schemeClr val="accent1"/>
           </a:effectRef>
           <a:fontRef idx="minor">
-            <a:schemeClr val="tx1"/>
+            <a:schemeClr val="lt1"/>
           </a:fontRef>
         </p:style>
-      </p:cxnSp>
-      <p:cxnSp>
-        <p:nvCxnSpPr>
-          <p:cNvPr id="16" name="Straight Arrow Connector 15">
-            <a:extLst>
-              <a:ext uri="{FF2B5EF4-FFF2-40B4-BE49-F238E27FC236}">
-                <a16:creationId xmlns:a16="http://schemas.microsoft.com/office/drawing/2014/main" id="{82E1482F-4302-4732-8F8C-078628F27234}"/>
-              </a:ext>
-            </a:extLst>
-          </p:cNvPr>
-          <p:cNvCxnSpPr>
-            <a:cxnSpLocks/>
-          </p:cNvCxnSpPr>
-          <p:nvPr/>
-        </p:nvCxnSpPr>
-        <p:spPr>
-          <a:xfrm>
-            <a:off x="9466489" y="969761"/>
-            <a:ext cx="0" cy="3358958"/>
-          </a:xfrm>
-          <a:prstGeom prst="straightConnector1">
-            <a:avLst/>
-          </a:prstGeom>
-          <a:ln w="76200">
-            <a:headEnd type="triangle" w="med" len="med"/>
-            <a:tailEnd type="triangle" w="med" len="med"/>
-          </a:ln>
+        <p:txBody>
+          <a:bodyPr rtlCol="0" anchor="ctr"/>
+          <a:lstStyle/>
+          <a:p>
+            <a:pPr algn="ctr"/>
+            <a:r>
+              <a:rPr lang="en-US" dirty="0" smtClean="0"/>
+              <a:t>Functional</a:t>
+            </a:r>
+            <a:endParaRPr lang="en-US" dirty="0"/>
+          </a:p>
+        </p:txBody>
+      </p:sp>
+      <p:sp>
+        <p:nvSpPr>
+          <p:cNvPr id="10" name="Rectangle 9"/>
+          <p:cNvSpPr/>
+          <p:nvPr/>
+        </p:nvSpPr>
+        <p:spPr>
+          <a:xfrm>
+            <a:off x="6171757" y="5003333"/>
+            <a:ext cx="1518081" cy="585926"/>
+          </a:xfrm>
+          <a:prstGeom prst="rect">
+            <a:avLst/>
+          </a:prstGeom>
         </p:spPr>
         <p:style>
-          <a:lnRef idx="1">
-            <a:schemeClr val="accent1"/>
+          <a:lnRef idx="2">
+            <a:schemeClr val="accent1">
+              <a:shade val="50000"/>
+            </a:schemeClr>
           </a:lnRef>
-          <a:fillRef idx="0">
+          <a:fillRef idx="1">
             <a:schemeClr val="accent1"/>
           </a:fillRef>
           <a:effectRef idx="0">
             <a:schemeClr val="accent1"/>
           </a:effectRef>
           <a:fontRef idx="minor">
-            <a:schemeClr val="tx1"/>
+            <a:schemeClr val="lt1"/>
           </a:fontRef>
         </p:style>
-      </p:cxnSp>
-      <p:sp>
-        <p:nvSpPr>
-          <p:cNvPr id="18" name="TextBox 17">
-            <a:extLst>
-              <a:ext uri="{FF2B5EF4-FFF2-40B4-BE49-F238E27FC236}">
-                <a16:creationId xmlns:a16="http://schemas.microsoft.com/office/drawing/2014/main" id="{8481BE7A-4437-4BCE-A5D4-170A969DF60A}"/>
-              </a:ext>
-            </a:extLst>
-          </p:cNvPr>
+        <p:txBody>
+          <a:bodyPr rtlCol="0" anchor="ctr"/>
+          <a:lstStyle/>
+          <a:p>
+            <a:pPr algn="ctr"/>
+            <a:r>
+              <a:rPr lang="en-US" dirty="0" smtClean="0"/>
+              <a:t>Smoke</a:t>
+            </a:r>
+            <a:endParaRPr lang="en-US" dirty="0"/>
+          </a:p>
+        </p:txBody>
+      </p:sp>
+      <p:sp>
+        <p:nvSpPr>
+          <p:cNvPr id="11" name="Rectangle 10"/>
+          <p:cNvSpPr/>
+          <p:nvPr/>
+        </p:nvSpPr>
+        <p:spPr>
+          <a:xfrm>
+            <a:off x="8137274" y="5797120"/>
+            <a:ext cx="1518081" cy="585926"/>
+          </a:xfrm>
+          <a:prstGeom prst="rect">
+            <a:avLst/>
+          </a:prstGeom>
+        </p:spPr>
+        <p:style>
+          <a:lnRef idx="2">
+            <a:schemeClr val="accent1">
+              <a:shade val="50000"/>
+            </a:schemeClr>
+          </a:lnRef>
+          <a:fillRef idx="1">
+            <a:schemeClr val="accent1"/>
+          </a:fillRef>
+          <a:effectRef idx="0">
+            <a:schemeClr val="accent1"/>
+          </a:effectRef>
+          <a:fontRef idx="minor">
+            <a:schemeClr val="lt1"/>
+          </a:fontRef>
+        </p:style>
+        <p:txBody>
+          <a:bodyPr rtlCol="0" anchor="ctr"/>
+          <a:lstStyle/>
+          <a:p>
+            <a:pPr algn="ctr"/>
+            <a:r>
+              <a:rPr lang="en-US" dirty="0" smtClean="0"/>
+              <a:t>Load</a:t>
+            </a:r>
+            <a:endParaRPr lang="en-US" dirty="0"/>
+          </a:p>
+        </p:txBody>
+      </p:sp>
+      <p:sp>
+        <p:nvSpPr>
+          <p:cNvPr id="12" name="Rectangle 11"/>
+          <p:cNvSpPr/>
+          <p:nvPr/>
+        </p:nvSpPr>
+        <p:spPr>
+          <a:xfrm>
+            <a:off x="8137274" y="5003333"/>
+            <a:ext cx="1518081" cy="585926"/>
+          </a:xfrm>
+          <a:prstGeom prst="rect">
+            <a:avLst/>
+          </a:prstGeom>
+        </p:spPr>
+        <p:style>
+          <a:lnRef idx="2">
+            <a:schemeClr val="accent1">
+              <a:shade val="50000"/>
+            </a:schemeClr>
+          </a:lnRef>
+          <a:fillRef idx="1">
+            <a:schemeClr val="accent1"/>
+          </a:fillRef>
+          <a:effectRef idx="0">
+            <a:schemeClr val="accent1"/>
+          </a:effectRef>
+          <a:fontRef idx="minor">
+            <a:schemeClr val="lt1"/>
+          </a:fontRef>
+        </p:style>
+        <p:txBody>
+          <a:bodyPr rtlCol="0" anchor="ctr"/>
+          <a:lstStyle/>
+          <a:p>
+            <a:pPr algn="ctr"/>
+            <a:r>
+              <a:rPr lang="en-US" dirty="0" smtClean="0"/>
+              <a:t>Performance</a:t>
+            </a:r>
+            <a:endParaRPr lang="en-US" dirty="0"/>
+          </a:p>
+        </p:txBody>
+      </p:sp>
+      <p:sp>
+        <p:nvSpPr>
+          <p:cNvPr id="13" name="TextBox 12"/>
           <p:cNvSpPr txBox="1"/>
           <p:nvPr/>
         </p:nvSpPr>
         <p:spPr>
           <a:xfrm>
-            <a:off x="9530478" y="2168277"/>
-            <a:ext cx="2323751" cy="369332"/>
+            <a:off x="1162974" y="4552818"/>
+            <a:ext cx="1755673" cy="369332"/>
           </a:xfrm>
           <a:prstGeom prst="rect">
             <a:avLst/>
@@ -3930,34 +3761,29 @@
           <a:noFill/>
         </p:spPr>
         <p:txBody>
-          <a:bodyPr wrap="square" rtlCol="0">
+          <a:bodyPr wrap="none" rtlCol="0">
             <a:spAutoFit/>
           </a:bodyPr>
           <a:lstStyle/>
           <a:p>
             <a:r>
-              <a:rPr lang="en-US" dirty="0"/>
-              <a:t>Post Deployment</a:t>
-            </a:r>
-          </a:p>
-        </p:txBody>
-      </p:sp>
-      <p:sp>
-        <p:nvSpPr>
-          <p:cNvPr id="19" name="TextBox 18">
-            <a:extLst>
-              <a:ext uri="{FF2B5EF4-FFF2-40B4-BE49-F238E27FC236}">
-                <a16:creationId xmlns:a16="http://schemas.microsoft.com/office/drawing/2014/main" id="{740DA599-2073-4961-8192-2D3D5B783E12}"/>
-              </a:ext>
-            </a:extLst>
-          </p:cNvPr>
+              <a:rPr lang="en-US" dirty="0" smtClean="0"/>
+              <a:t>Pre Deployment</a:t>
+            </a:r>
+            <a:endParaRPr lang="en-US" dirty="0"/>
+          </a:p>
+        </p:txBody>
+      </p:sp>
+      <p:sp>
+        <p:nvSpPr>
+          <p:cNvPr id="14" name="TextBox 13"/>
           <p:cNvSpPr txBox="1"/>
           <p:nvPr/>
         </p:nvSpPr>
         <p:spPr>
           <a:xfrm>
-            <a:off x="9530478" y="4974036"/>
-            <a:ext cx="2323751" cy="369332"/>
+            <a:off x="6171756" y="4552818"/>
+            <a:ext cx="1791581" cy="369332"/>
           </a:xfrm>
           <a:prstGeom prst="rect">
             <a:avLst/>
@@ -3965,22 +3791,23 @@
           <a:noFill/>
         </p:spPr>
         <p:txBody>
-          <a:bodyPr wrap="square" rtlCol="0">
+          <a:bodyPr wrap="none" rtlCol="0">
             <a:spAutoFit/>
           </a:bodyPr>
           <a:lstStyle/>
           <a:p>
             <a:r>
-              <a:rPr lang="en-US" dirty="0"/>
-              <a:t>Pre Deployment</a:t>
-            </a:r>
+              <a:rPr lang="en-US" dirty="0" smtClean="0"/>
+              <a:t>Post Deployment</a:t>
+            </a:r>
+            <a:endParaRPr lang="en-US" dirty="0"/>
           </a:p>
         </p:txBody>
       </p:sp>
     </p:spTree>
     <p:extLst>
       <p:ext uri="{BB962C8B-B14F-4D97-AF65-F5344CB8AC3E}">
-        <p14:creationId xmlns:p14="http://schemas.microsoft.com/office/powerpoint/2010/main" val="219039541"/>
+        <p14:creationId xmlns:p14="http://schemas.microsoft.com/office/powerpoint/2010/main" val="583448983"/>
       </p:ext>
     </p:extLst>
   </p:cSld>
@@ -4009,10 +3836,10 @@
       </p:grpSpPr>
       <p:sp>
         <p:nvSpPr>
-          <p:cNvPr id="21" name="Rectangle 20">
-            <a:extLst>
-              <a:ext uri="{FF2B5EF4-FFF2-40B4-BE49-F238E27FC236}">
-                <a16:creationId xmlns:a16="http://schemas.microsoft.com/office/drawing/2014/main" id="{E51017CA-40ED-4CBA-8DC5-FD96CB212950}"/>
+          <p:cNvPr id="5" name="Isosceles Triangle 4">
+            <a:extLst>
+              <a:ext uri="{FF2B5EF4-FFF2-40B4-BE49-F238E27FC236}">
+                <a16:creationId xmlns:a16="http://schemas.microsoft.com/office/drawing/2014/main" id="{F6FF05A0-A1B6-4816-A570-59A9A90AAB11}"/>
               </a:ext>
             </a:extLst>
           </p:cNvPr>
@@ -4021,10 +3848,10 @@
         </p:nvSpPr>
         <p:spPr>
           <a:xfrm>
-            <a:off x="4271395" y="2044232"/>
-            <a:ext cx="2906785" cy="2678688"/>
-          </a:xfrm>
-          <a:prstGeom prst="rect">
+            <a:off x="3162650" y="1149292"/>
+            <a:ext cx="5620624" cy="4845366"/>
+          </a:xfrm>
+          <a:prstGeom prst="triangle">
             <a:avLst/>
           </a:prstGeom>
         </p:spPr>
@@ -4055,119 +3882,25 @@
       </p:sp>
       <p:sp>
         <p:nvSpPr>
-          <p:cNvPr id="22" name="Rectangle 21">
-            <a:extLst>
-              <a:ext uri="{FF2B5EF4-FFF2-40B4-BE49-F238E27FC236}">
-                <a16:creationId xmlns:a16="http://schemas.microsoft.com/office/drawing/2014/main" id="{89677ACD-2187-4AB3-A199-5B9F642C71A3}"/>
-              </a:ext>
-            </a:extLst>
-          </p:cNvPr>
-          <p:cNvSpPr/>
-          <p:nvPr/>
-        </p:nvSpPr>
-        <p:spPr>
-          <a:xfrm>
-            <a:off x="9163573" y="2044231"/>
-            <a:ext cx="2751590" cy="2678688"/>
+          <p:cNvPr id="6" name="TextBox 5">
+            <a:extLst>
+              <a:ext uri="{FF2B5EF4-FFF2-40B4-BE49-F238E27FC236}">
+                <a16:creationId xmlns:a16="http://schemas.microsoft.com/office/drawing/2014/main" id="{8B974FEC-4E86-459C-9FB4-EAD331D30D04}"/>
+              </a:ext>
+            </a:extLst>
+          </p:cNvPr>
+          <p:cNvSpPr txBox="1"/>
+          <p:nvPr/>
+        </p:nvSpPr>
+        <p:spPr>
+          <a:xfrm>
+            <a:off x="3158455" y="5440660"/>
+            <a:ext cx="5620623" cy="369332"/>
           </a:xfrm>
           <a:prstGeom prst="rect">
             <a:avLst/>
           </a:prstGeom>
-        </p:spPr>
-        <p:style>
-          <a:lnRef idx="2">
-            <a:schemeClr val="accent1">
-              <a:shade val="50000"/>
-            </a:schemeClr>
-          </a:lnRef>
-          <a:fillRef idx="1">
-            <a:schemeClr val="accent1"/>
-          </a:fillRef>
-          <a:effectRef idx="0">
-            <a:schemeClr val="accent1"/>
-          </a:effectRef>
-          <a:fontRef idx="minor">
-            <a:schemeClr val="lt1"/>
-          </a:fontRef>
-        </p:style>
-        <p:txBody>
-          <a:bodyPr rtlCol="0" anchor="ctr"/>
-          <a:lstStyle/>
-          <a:p>
-            <a:pPr algn="ctr"/>
-            <a:endParaRPr lang="en-US"/>
-          </a:p>
-        </p:txBody>
-      </p:sp>
-      <p:sp>
-        <p:nvSpPr>
-          <p:cNvPr id="4" name="Rectangle 3">
-            <a:extLst>
-              <a:ext uri="{FF2B5EF4-FFF2-40B4-BE49-F238E27FC236}">
-                <a16:creationId xmlns:a16="http://schemas.microsoft.com/office/drawing/2014/main" id="{3293DE28-5051-44B7-9707-028FB246F8DE}"/>
-              </a:ext>
-            </a:extLst>
-          </p:cNvPr>
-          <p:cNvSpPr/>
-          <p:nvPr/>
-        </p:nvSpPr>
-        <p:spPr>
-          <a:xfrm>
-            <a:off x="534097" y="2044232"/>
-            <a:ext cx="2751590" cy="2678688"/>
-          </a:xfrm>
-          <a:prstGeom prst="rect">
-            <a:avLst/>
-          </a:prstGeom>
-        </p:spPr>
-        <p:style>
-          <a:lnRef idx="2">
-            <a:schemeClr val="accent1">
-              <a:shade val="50000"/>
-            </a:schemeClr>
-          </a:lnRef>
-          <a:fillRef idx="1">
-            <a:schemeClr val="accent1"/>
-          </a:fillRef>
-          <a:effectRef idx="0">
-            <a:schemeClr val="accent1"/>
-          </a:effectRef>
-          <a:fontRef idx="minor">
-            <a:schemeClr val="lt1"/>
-          </a:fontRef>
-        </p:style>
-        <p:txBody>
-          <a:bodyPr rtlCol="0" anchor="ctr"/>
-          <a:lstStyle/>
-          <a:p>
-            <a:pPr algn="ctr"/>
-            <a:endParaRPr lang="en-US"/>
-          </a:p>
-        </p:txBody>
-      </p:sp>
-      <p:sp>
-        <p:nvSpPr>
-          <p:cNvPr id="8" name="TextBox 7">
-            <a:extLst>
-              <a:ext uri="{FF2B5EF4-FFF2-40B4-BE49-F238E27FC236}">
-                <a16:creationId xmlns:a16="http://schemas.microsoft.com/office/drawing/2014/main" id="{94AFC469-9708-4612-9789-5C85ECC85483}"/>
-              </a:ext>
-            </a:extLst>
-          </p:cNvPr>
-          <p:cNvSpPr txBox="1"/>
-          <p:nvPr/>
-        </p:nvSpPr>
-        <p:spPr>
-          <a:xfrm>
-            <a:off x="1540263" y="2416028"/>
-            <a:ext cx="739259" cy="369332"/>
-          </a:xfrm>
-          <a:prstGeom prst="rect">
-            <a:avLst/>
-          </a:prstGeom>
-          <a:solidFill>
-            <a:schemeClr val="accent4"/>
-          </a:solidFill>
+          <a:noFill/>
         </p:spPr>
         <p:txBody>
           <a:bodyPr wrap="square" rtlCol="0">
@@ -4175,19 +3908,20 @@
           </a:bodyPr>
           <a:lstStyle/>
           <a:p>
+            <a:pPr algn="ctr"/>
             <a:r>
               <a:rPr lang="en-US" dirty="0"/>
-              <a:t>Build</a:t>
-            </a:r>
-          </a:p>
-        </p:txBody>
-      </p:sp>
-      <p:sp>
-        <p:nvSpPr>
-          <p:cNvPr id="9" name="TextBox 8">
-            <a:extLst>
-              <a:ext uri="{FF2B5EF4-FFF2-40B4-BE49-F238E27FC236}">
-                <a16:creationId xmlns:a16="http://schemas.microsoft.com/office/drawing/2014/main" id="{E00D4313-AA02-489F-B655-6E88FFBFA87D}"/>
+              <a:t>Unit</a:t>
+            </a:r>
+          </a:p>
+        </p:txBody>
+      </p:sp>
+      <p:sp>
+        <p:nvSpPr>
+          <p:cNvPr id="7" name="TextBox 6">
+            <a:extLst>
+              <a:ext uri="{FF2B5EF4-FFF2-40B4-BE49-F238E27FC236}">
+                <a16:creationId xmlns:a16="http://schemas.microsoft.com/office/drawing/2014/main" id="{B1329BB2-4A29-44B9-A05A-3EEA173ACA8A}"/>
               </a:ext>
             </a:extLst>
           </p:cNvPr>
@@ -4196,42 +3930,35 @@
         </p:nvSpPr>
         <p:spPr>
           <a:xfrm>
-            <a:off x="1159077" y="2828919"/>
-            <a:ext cx="1501630" cy="369332"/>
+            <a:off x="3162647" y="4611476"/>
+            <a:ext cx="5620623" cy="369332"/>
           </a:xfrm>
           <a:prstGeom prst="rect">
             <a:avLst/>
           </a:prstGeom>
-          <a:solidFill>
-            <a:schemeClr val="accent2">
-              <a:lumMod val="40000"/>
-              <a:lumOff val="60000"/>
-            </a:schemeClr>
-          </a:solidFill>
+          <a:noFill/>
         </p:spPr>
         <p:txBody>
           <a:bodyPr wrap="square" rtlCol="0">
             <a:spAutoFit/>
           </a:bodyPr>
-          <a:lstStyle>
-            <a:defPPr>
-              <a:defRPr lang="en-US"/>
-            </a:defPPr>
-          </a:lstStyle>
-          <a:p>
-            <a:r>
-              <a:rPr lang="en-US" dirty="0"/>
-              <a:t>Unit/Int. tests</a:t>
-            </a:r>
-          </a:p>
-        </p:txBody>
-      </p:sp>
-      <p:sp>
-        <p:nvSpPr>
-          <p:cNvPr id="10" name="TextBox 9">
-            <a:extLst>
-              <a:ext uri="{FF2B5EF4-FFF2-40B4-BE49-F238E27FC236}">
-                <a16:creationId xmlns:a16="http://schemas.microsoft.com/office/drawing/2014/main" id="{017F682C-BC3C-46B6-ADCE-834E38109D89}"/>
+          <a:lstStyle/>
+          <a:p>
+            <a:pPr algn="ctr"/>
+            <a:r>
+              <a:rPr lang="en-US" dirty="0" smtClean="0"/>
+              <a:t>Integration</a:t>
+            </a:r>
+            <a:endParaRPr lang="en-US" dirty="0"/>
+          </a:p>
+        </p:txBody>
+      </p:sp>
+      <p:sp>
+        <p:nvSpPr>
+          <p:cNvPr id="8" name="TextBox 7">
+            <a:extLst>
+              <a:ext uri="{FF2B5EF4-FFF2-40B4-BE49-F238E27FC236}">
+                <a16:creationId xmlns:a16="http://schemas.microsoft.com/office/drawing/2014/main" id="{B4C40372-3301-4408-9995-D1033570A64E}"/>
               </a:ext>
             </a:extLst>
           </p:cNvPr>
@@ -4240,8 +3967,8 @@
         </p:nvSpPr>
         <p:spPr>
           <a:xfrm>
-            <a:off x="492339" y="3316741"/>
-            <a:ext cx="1905346" cy="369332"/>
+            <a:off x="3162643" y="3597626"/>
+            <a:ext cx="5620623" cy="369332"/>
           </a:xfrm>
           <a:prstGeom prst="rect">
             <a:avLst/>
@@ -4254,19 +3981,20 @@
           </a:bodyPr>
           <a:lstStyle/>
           <a:p>
+            <a:pPr algn="ctr"/>
             <a:r>
               <a:rPr lang="en-US" dirty="0"/>
-              <a:t>Deploy to dev slot</a:t>
-            </a:r>
-          </a:p>
-        </p:txBody>
-      </p:sp>
-      <p:sp>
-        <p:nvSpPr>
-          <p:cNvPr id="13" name="TextBox 12">
-            <a:extLst>
-              <a:ext uri="{FF2B5EF4-FFF2-40B4-BE49-F238E27FC236}">
-                <a16:creationId xmlns:a16="http://schemas.microsoft.com/office/drawing/2014/main" id="{B591B7B9-6140-466D-ABAD-AA8D6EABAB0C}"/>
+              <a:t>Smoke / Functional</a:t>
+            </a:r>
+          </a:p>
+        </p:txBody>
+      </p:sp>
+      <p:sp>
+        <p:nvSpPr>
+          <p:cNvPr id="9" name="TextBox 8">
+            <a:extLst>
+              <a:ext uri="{FF2B5EF4-FFF2-40B4-BE49-F238E27FC236}">
+                <a16:creationId xmlns:a16="http://schemas.microsoft.com/office/drawing/2014/main" id="{316653F4-3D2C-43D6-91C5-F563A73034A5}"/>
               </a:ext>
             </a:extLst>
           </p:cNvPr>
@@ -4275,8 +4003,8 @@
         </p:nvSpPr>
         <p:spPr>
           <a:xfrm>
-            <a:off x="4271222" y="2038352"/>
-            <a:ext cx="2541864" cy="369332"/>
+            <a:off x="3162643" y="2583776"/>
+            <a:ext cx="5620623" cy="369332"/>
           </a:xfrm>
           <a:prstGeom prst="rect">
             <a:avLst/>
@@ -4289,945 +4017,20 @@
           </a:bodyPr>
           <a:lstStyle/>
           <a:p>
+            <a:pPr algn="ctr"/>
             <a:r>
               <a:rPr lang="en-US" dirty="0"/>
-              <a:t>Deploy to QA/UAT slot</a:t>
-            </a:r>
-          </a:p>
-        </p:txBody>
-      </p:sp>
-      <p:sp>
-        <p:nvSpPr>
-          <p:cNvPr id="14" name="TextBox 13">
-            <a:extLst>
-              <a:ext uri="{FF2B5EF4-FFF2-40B4-BE49-F238E27FC236}">
-                <a16:creationId xmlns:a16="http://schemas.microsoft.com/office/drawing/2014/main" id="{CCFD35FD-8076-4FA0-B05B-8AA7D57D76D1}"/>
-              </a:ext>
-            </a:extLst>
-          </p:cNvPr>
-          <p:cNvSpPr txBox="1"/>
-          <p:nvPr/>
-        </p:nvSpPr>
-        <p:spPr>
-          <a:xfrm>
-            <a:off x="4475872" y="4078933"/>
-            <a:ext cx="2483142" cy="584775"/>
-          </a:xfrm>
-          <a:prstGeom prst="rect">
-            <a:avLst/>
-          </a:prstGeom>
-          <a:solidFill>
-            <a:schemeClr val="accent2">
-              <a:lumMod val="40000"/>
-              <a:lumOff val="60000"/>
-            </a:schemeClr>
-          </a:solidFill>
-        </p:spPr>
-        <p:txBody>
-          <a:bodyPr wrap="square" rtlCol="0">
-            <a:spAutoFit/>
-          </a:bodyPr>
-          <a:lstStyle/>
-          <a:p>
-            <a:r>
-              <a:rPr lang="en-US" sz="1600" dirty="0"/>
-              <a:t>Functional, Load</a:t>
-            </a:r>
-            <a:br>
-              <a:rPr lang="en-US" sz="1600" dirty="0"/>
-            </a:br>
-            <a:r>
-              <a:rPr lang="en-US" sz="1600" dirty="0"/>
-              <a:t>Performance, End to End</a:t>
-            </a:r>
-            <a:endParaRPr lang="en-US" dirty="0"/>
-          </a:p>
-        </p:txBody>
-      </p:sp>
-      <p:sp>
-        <p:nvSpPr>
-          <p:cNvPr id="16" name="TextBox 15">
-            <a:extLst>
-              <a:ext uri="{FF2B5EF4-FFF2-40B4-BE49-F238E27FC236}">
-                <a16:creationId xmlns:a16="http://schemas.microsoft.com/office/drawing/2014/main" id="{A966F983-30A3-469E-B0F0-9873CED87A3B}"/>
-              </a:ext>
-            </a:extLst>
-          </p:cNvPr>
-          <p:cNvSpPr txBox="1"/>
-          <p:nvPr/>
-        </p:nvSpPr>
-        <p:spPr>
-          <a:xfrm>
-            <a:off x="9163572" y="2066482"/>
-            <a:ext cx="2013326" cy="369332"/>
-          </a:xfrm>
-          <a:prstGeom prst="rect">
-            <a:avLst/>
-          </a:prstGeom>
-          <a:noFill/>
-        </p:spPr>
-        <p:txBody>
-          <a:bodyPr wrap="square" rtlCol="0">
-            <a:spAutoFit/>
-          </a:bodyPr>
-          <a:lstStyle/>
-          <a:p>
-            <a:r>
-              <a:rPr lang="en-US" dirty="0"/>
-              <a:t>Deploy to Prod slot</a:t>
-            </a:r>
-          </a:p>
-        </p:txBody>
-      </p:sp>
-      <p:sp>
-        <p:nvSpPr>
-          <p:cNvPr id="17" name="TextBox 16">
-            <a:extLst>
-              <a:ext uri="{FF2B5EF4-FFF2-40B4-BE49-F238E27FC236}">
-                <a16:creationId xmlns:a16="http://schemas.microsoft.com/office/drawing/2014/main" id="{95B59D1C-A871-44F9-906B-05BB681E6FFC}"/>
-              </a:ext>
-            </a:extLst>
-          </p:cNvPr>
-          <p:cNvSpPr txBox="1"/>
-          <p:nvPr/>
-        </p:nvSpPr>
-        <p:spPr>
-          <a:xfrm>
-            <a:off x="9838365" y="3658167"/>
-            <a:ext cx="1402006" cy="369332"/>
-          </a:xfrm>
-          <a:prstGeom prst="rect">
-            <a:avLst/>
-          </a:prstGeom>
-          <a:solidFill>
-            <a:schemeClr val="accent2">
-              <a:lumMod val="40000"/>
-              <a:lumOff val="60000"/>
-            </a:schemeClr>
-          </a:solidFill>
-        </p:spPr>
-        <p:txBody>
-          <a:bodyPr wrap="square" rtlCol="0">
-            <a:spAutoFit/>
-          </a:bodyPr>
-          <a:lstStyle/>
-          <a:p>
-            <a:r>
-              <a:rPr lang="en-US" dirty="0"/>
-              <a:t>Smoke tests</a:t>
-            </a:r>
-          </a:p>
-        </p:txBody>
-      </p:sp>
-      <p:sp>
-        <p:nvSpPr>
-          <p:cNvPr id="24" name="TextBox 23">
-            <a:extLst>
-              <a:ext uri="{FF2B5EF4-FFF2-40B4-BE49-F238E27FC236}">
-                <a16:creationId xmlns:a16="http://schemas.microsoft.com/office/drawing/2014/main" id="{50DA781A-8537-47EA-97F0-8708F15C1582}"/>
-              </a:ext>
-            </a:extLst>
-          </p:cNvPr>
-          <p:cNvSpPr txBox="1"/>
-          <p:nvPr/>
-        </p:nvSpPr>
-        <p:spPr>
-          <a:xfrm>
-            <a:off x="4973972" y="2416029"/>
-            <a:ext cx="1501630" cy="369332"/>
-          </a:xfrm>
-          <a:prstGeom prst="rect">
-            <a:avLst/>
-          </a:prstGeom>
-          <a:solidFill>
-            <a:schemeClr val="accent4"/>
-          </a:solidFill>
-        </p:spPr>
-        <p:txBody>
-          <a:bodyPr wrap="square" rtlCol="0">
-            <a:spAutoFit/>
-          </a:bodyPr>
-          <a:lstStyle>
-            <a:defPPr>
-              <a:defRPr lang="en-US"/>
-            </a:defPPr>
-          </a:lstStyle>
-          <a:p>
-            <a:r>
-              <a:rPr lang="en-US" dirty="0"/>
-              <a:t>Original Build</a:t>
-            </a:r>
-          </a:p>
-        </p:txBody>
-      </p:sp>
-      <p:sp>
-        <p:nvSpPr>
-          <p:cNvPr id="26" name="TextBox 25">
-            <a:extLst>
-              <a:ext uri="{FF2B5EF4-FFF2-40B4-BE49-F238E27FC236}">
-                <a16:creationId xmlns:a16="http://schemas.microsoft.com/office/drawing/2014/main" id="{FAD39E70-8356-4606-84D6-E90D4C5E0B2B}"/>
-              </a:ext>
-            </a:extLst>
-          </p:cNvPr>
-          <p:cNvSpPr txBox="1"/>
-          <p:nvPr/>
-        </p:nvSpPr>
-        <p:spPr>
-          <a:xfrm>
-            <a:off x="9788553" y="2426661"/>
-            <a:ext cx="1501630" cy="369332"/>
-          </a:xfrm>
-          <a:prstGeom prst="rect">
-            <a:avLst/>
-          </a:prstGeom>
-          <a:solidFill>
-            <a:schemeClr val="accent4"/>
-          </a:solidFill>
-        </p:spPr>
-        <p:txBody>
-          <a:bodyPr wrap="square" rtlCol="0">
-            <a:spAutoFit/>
-          </a:bodyPr>
-          <a:lstStyle/>
-          <a:p>
-            <a:r>
-              <a:rPr lang="en-US" dirty="0"/>
-              <a:t>Original Build</a:t>
+              <a:t>End to End</a:t>
             </a:r>
           </a:p>
         </p:txBody>
       </p:sp>
       <p:cxnSp>
         <p:nvCxnSpPr>
-          <p:cNvPr id="35" name="Straight Arrow Connector 34">
-            <a:extLst>
-              <a:ext uri="{FF2B5EF4-FFF2-40B4-BE49-F238E27FC236}">
-                <a16:creationId xmlns:a16="http://schemas.microsoft.com/office/drawing/2014/main" id="{3819DC03-FE8A-477C-A48A-4A005646E848}"/>
-              </a:ext>
-            </a:extLst>
-          </p:cNvPr>
-          <p:cNvCxnSpPr>
-            <a:cxnSpLocks/>
-            <a:stCxn id="38" idx="3"/>
-            <a:endCxn id="22" idx="1"/>
-          </p:cNvCxnSpPr>
-          <p:nvPr/>
-        </p:nvCxnSpPr>
-        <p:spPr>
-          <a:xfrm flipV="1">
-            <a:off x="7182374" y="3383575"/>
-            <a:ext cx="1981199" cy="2273912"/>
-          </a:xfrm>
-          <a:prstGeom prst="straightConnector1">
-            <a:avLst/>
-          </a:prstGeom>
-          <a:ln w="19050">
-            <a:solidFill>
-              <a:srgbClr val="FF0000"/>
-            </a:solidFill>
-            <a:prstDash val="dash"/>
-            <a:tailEnd type="triangle"/>
-          </a:ln>
-        </p:spPr>
-        <p:style>
-          <a:lnRef idx="3">
-            <a:schemeClr val="accent2"/>
-          </a:lnRef>
-          <a:fillRef idx="0">
-            <a:schemeClr val="accent2"/>
-          </a:fillRef>
-          <a:effectRef idx="2">
-            <a:schemeClr val="accent2"/>
-          </a:effectRef>
-          <a:fontRef idx="minor">
-            <a:schemeClr val="tx1"/>
-          </a:fontRef>
-        </p:style>
-      </p:cxnSp>
-      <p:cxnSp>
-        <p:nvCxnSpPr>
-          <p:cNvPr id="40" name="Straight Arrow Connector 39">
-            <a:extLst>
-              <a:ext uri="{FF2B5EF4-FFF2-40B4-BE49-F238E27FC236}">
-                <a16:creationId xmlns:a16="http://schemas.microsoft.com/office/drawing/2014/main" id="{FC129F2E-6AB2-4299-971F-ECEDA7019217}"/>
-              </a:ext>
-            </a:extLst>
-          </p:cNvPr>
-          <p:cNvCxnSpPr>
-            <a:cxnSpLocks/>
-            <a:stCxn id="36" idx="3"/>
-          </p:cNvCxnSpPr>
-          <p:nvPr/>
-        </p:nvCxnSpPr>
-        <p:spPr>
-          <a:xfrm flipV="1">
-            <a:off x="3285687" y="3429001"/>
-            <a:ext cx="981510" cy="2228486"/>
-          </a:xfrm>
-          <a:prstGeom prst="straightConnector1">
-            <a:avLst/>
-          </a:prstGeom>
-          <a:ln w="19050">
-            <a:solidFill>
-              <a:srgbClr val="FF0000"/>
-            </a:solidFill>
-            <a:prstDash val="dash"/>
-            <a:tailEnd type="triangle"/>
-          </a:ln>
-        </p:spPr>
-        <p:style>
-          <a:lnRef idx="3">
-            <a:schemeClr val="accent2"/>
-          </a:lnRef>
-          <a:fillRef idx="0">
-            <a:schemeClr val="accent2"/>
-          </a:fillRef>
-          <a:effectRef idx="2">
-            <a:schemeClr val="accent2"/>
-          </a:effectRef>
-          <a:fontRef idx="minor">
-            <a:schemeClr val="tx1"/>
-          </a:fontRef>
-        </p:style>
-      </p:cxnSp>
-      <p:sp>
-        <p:nvSpPr>
-          <p:cNvPr id="42" name="TextBox 41">
-            <a:extLst>
-              <a:ext uri="{FF2B5EF4-FFF2-40B4-BE49-F238E27FC236}">
-                <a16:creationId xmlns:a16="http://schemas.microsoft.com/office/drawing/2014/main" id="{FF214A27-0C69-4B65-9137-903F15CF1452}"/>
-              </a:ext>
-            </a:extLst>
-          </p:cNvPr>
-          <p:cNvSpPr txBox="1"/>
-          <p:nvPr/>
-        </p:nvSpPr>
-        <p:spPr>
-          <a:xfrm>
-            <a:off x="7629094" y="4353587"/>
-            <a:ext cx="1126218" cy="369332"/>
-          </a:xfrm>
-          <a:prstGeom prst="rect">
-            <a:avLst/>
-          </a:prstGeom>
-          <a:solidFill>
-            <a:schemeClr val="accent6">
-              <a:lumMod val="60000"/>
-              <a:lumOff val="40000"/>
-            </a:schemeClr>
-          </a:solidFill>
-        </p:spPr>
-        <p:txBody>
-          <a:bodyPr wrap="square" rtlCol="0">
-            <a:spAutoFit/>
-          </a:bodyPr>
-          <a:lstStyle/>
-          <a:p>
-            <a:r>
-              <a:rPr lang="en-US" dirty="0"/>
-              <a:t>Approval</a:t>
-            </a:r>
-          </a:p>
-        </p:txBody>
-      </p:sp>
-      <p:sp>
-        <p:nvSpPr>
-          <p:cNvPr id="44" name="TextBox 43">
-            <a:extLst>
-              <a:ext uri="{FF2B5EF4-FFF2-40B4-BE49-F238E27FC236}">
-                <a16:creationId xmlns:a16="http://schemas.microsoft.com/office/drawing/2014/main" id="{F37BE299-E622-495B-B75D-DCDFF2576F6B}"/>
-              </a:ext>
-            </a:extLst>
-          </p:cNvPr>
-          <p:cNvSpPr txBox="1"/>
-          <p:nvPr/>
-        </p:nvSpPr>
-        <p:spPr>
-          <a:xfrm>
-            <a:off x="173373" y="67882"/>
-            <a:ext cx="9314576" cy="646331"/>
-          </a:xfrm>
-          <a:prstGeom prst="rect">
-            <a:avLst/>
-          </a:prstGeom>
-          <a:noFill/>
-        </p:spPr>
-        <p:txBody>
-          <a:bodyPr wrap="square" rtlCol="0">
-            <a:spAutoFit/>
-          </a:bodyPr>
-          <a:lstStyle/>
-          <a:p>
-            <a:r>
-              <a:rPr lang="en-US" sz="3600" dirty="0"/>
-              <a:t>CI-CD with gated testing   </a:t>
-            </a:r>
-            <a:r>
-              <a:rPr lang="en-US" sz="2000" dirty="0"/>
-              <a:t>Build once test many.</a:t>
-            </a:r>
-            <a:endParaRPr lang="en-US" sz="3600" dirty="0"/>
-          </a:p>
-        </p:txBody>
-      </p:sp>
-      <p:sp>
-        <p:nvSpPr>
-          <p:cNvPr id="45" name="TextBox 44">
-            <a:extLst>
-              <a:ext uri="{FF2B5EF4-FFF2-40B4-BE49-F238E27FC236}">
-                <a16:creationId xmlns:a16="http://schemas.microsoft.com/office/drawing/2014/main" id="{67654F9F-410B-4ECC-8AA8-2C82A7D3C948}"/>
-              </a:ext>
-            </a:extLst>
-          </p:cNvPr>
-          <p:cNvSpPr txBox="1"/>
-          <p:nvPr/>
-        </p:nvSpPr>
-        <p:spPr>
-          <a:xfrm>
-            <a:off x="534097" y="710556"/>
-            <a:ext cx="2751590" cy="646331"/>
-          </a:xfrm>
-          <a:prstGeom prst="rect">
-            <a:avLst/>
-          </a:prstGeom>
-          <a:noFill/>
-        </p:spPr>
-        <p:txBody>
-          <a:bodyPr wrap="square" rtlCol="0">
-            <a:spAutoFit/>
-          </a:bodyPr>
-          <a:lstStyle/>
-          <a:p>
-            <a:pPr algn="ctr"/>
-            <a:r>
-              <a:rPr lang="en-US" sz="3600" dirty="0"/>
-              <a:t>Dev</a:t>
-            </a:r>
-          </a:p>
-        </p:txBody>
-      </p:sp>
-      <p:sp>
-        <p:nvSpPr>
-          <p:cNvPr id="46" name="TextBox 45">
-            <a:extLst>
-              <a:ext uri="{FF2B5EF4-FFF2-40B4-BE49-F238E27FC236}">
-                <a16:creationId xmlns:a16="http://schemas.microsoft.com/office/drawing/2014/main" id="{FCEAA835-0ED4-463A-9E9A-67DEFBA46D10}"/>
-              </a:ext>
-            </a:extLst>
-          </p:cNvPr>
-          <p:cNvSpPr txBox="1"/>
-          <p:nvPr/>
-        </p:nvSpPr>
-        <p:spPr>
-          <a:xfrm>
-            <a:off x="4278211" y="710556"/>
-            <a:ext cx="2904163" cy="646331"/>
-          </a:xfrm>
-          <a:prstGeom prst="rect">
-            <a:avLst/>
-          </a:prstGeom>
-          <a:noFill/>
-        </p:spPr>
-        <p:txBody>
-          <a:bodyPr wrap="square" rtlCol="0">
-            <a:spAutoFit/>
-          </a:bodyPr>
-          <a:lstStyle/>
-          <a:p>
-            <a:pPr algn="ctr"/>
-            <a:r>
-              <a:rPr lang="en-US" sz="3600" dirty="0"/>
-              <a:t>QA / UAT</a:t>
-            </a:r>
-          </a:p>
-        </p:txBody>
-      </p:sp>
-      <p:sp>
-        <p:nvSpPr>
-          <p:cNvPr id="47" name="TextBox 46">
-            <a:extLst>
-              <a:ext uri="{FF2B5EF4-FFF2-40B4-BE49-F238E27FC236}">
-                <a16:creationId xmlns:a16="http://schemas.microsoft.com/office/drawing/2014/main" id="{A4D36E49-32DA-4F3A-A09A-FF85F1F10F50}"/>
-              </a:ext>
-            </a:extLst>
-          </p:cNvPr>
-          <p:cNvSpPr txBox="1"/>
-          <p:nvPr/>
-        </p:nvSpPr>
-        <p:spPr>
-          <a:xfrm>
-            <a:off x="9180357" y="710556"/>
-            <a:ext cx="2751590" cy="646331"/>
-          </a:xfrm>
-          <a:prstGeom prst="rect">
-            <a:avLst/>
-          </a:prstGeom>
-          <a:noFill/>
-        </p:spPr>
-        <p:txBody>
-          <a:bodyPr wrap="square" rtlCol="0">
-            <a:spAutoFit/>
-          </a:bodyPr>
-          <a:lstStyle/>
-          <a:p>
-            <a:pPr algn="ctr"/>
-            <a:r>
-              <a:rPr lang="en-US" sz="3600" dirty="0"/>
-              <a:t>Prod</a:t>
-            </a:r>
-          </a:p>
-        </p:txBody>
-      </p:sp>
-      <p:sp>
-        <p:nvSpPr>
-          <p:cNvPr id="48" name="TextBox 47">
-            <a:extLst>
-              <a:ext uri="{FF2B5EF4-FFF2-40B4-BE49-F238E27FC236}">
-                <a16:creationId xmlns:a16="http://schemas.microsoft.com/office/drawing/2014/main" id="{E7B8C68B-70BB-4651-A97C-A2F3E3194F0A}"/>
-              </a:ext>
-            </a:extLst>
-          </p:cNvPr>
-          <p:cNvSpPr txBox="1"/>
-          <p:nvPr/>
-        </p:nvSpPr>
-        <p:spPr>
-          <a:xfrm>
-            <a:off x="550873" y="1151866"/>
-            <a:ext cx="2751590" cy="646331"/>
-          </a:xfrm>
-          <a:prstGeom prst="rect">
-            <a:avLst/>
-          </a:prstGeom>
-          <a:noFill/>
-        </p:spPr>
-        <p:txBody>
-          <a:bodyPr wrap="square" rtlCol="0">
-            <a:spAutoFit/>
-          </a:bodyPr>
-          <a:lstStyle/>
-          <a:p>
-            <a:pPr algn="ctr"/>
-            <a:r>
-              <a:rPr lang="en-US" dirty="0"/>
-              <a:t>Minimal tests to ensure connectivity.</a:t>
-            </a:r>
-          </a:p>
-        </p:txBody>
-      </p:sp>
-      <p:sp>
-        <p:nvSpPr>
-          <p:cNvPr id="49" name="TextBox 48">
-            <a:extLst>
-              <a:ext uri="{FF2B5EF4-FFF2-40B4-BE49-F238E27FC236}">
-                <a16:creationId xmlns:a16="http://schemas.microsoft.com/office/drawing/2014/main" id="{4CA122C4-F2CA-4703-BEDA-9E48582D14C6}"/>
-              </a:ext>
-            </a:extLst>
-          </p:cNvPr>
-          <p:cNvSpPr txBox="1"/>
-          <p:nvPr/>
-        </p:nvSpPr>
-        <p:spPr>
-          <a:xfrm>
-            <a:off x="4267200" y="1171578"/>
-            <a:ext cx="2751590" cy="646331"/>
-          </a:xfrm>
-          <a:prstGeom prst="rect">
-            <a:avLst/>
-          </a:prstGeom>
-          <a:noFill/>
-        </p:spPr>
-        <p:txBody>
-          <a:bodyPr wrap="square" rtlCol="0">
-            <a:spAutoFit/>
-          </a:bodyPr>
-          <a:lstStyle/>
-          <a:p>
-            <a:pPr algn="ctr"/>
-            <a:r>
-              <a:rPr lang="en-US" dirty="0"/>
-              <a:t>Robust tests to ensure quality.</a:t>
-            </a:r>
-          </a:p>
-        </p:txBody>
-      </p:sp>
-      <p:sp>
-        <p:nvSpPr>
-          <p:cNvPr id="50" name="TextBox 49">
-            <a:extLst>
-              <a:ext uri="{FF2B5EF4-FFF2-40B4-BE49-F238E27FC236}">
-                <a16:creationId xmlns:a16="http://schemas.microsoft.com/office/drawing/2014/main" id="{4AA14186-7262-4D46-94BB-4D64FDBD70A9}"/>
-              </a:ext>
-            </a:extLst>
-          </p:cNvPr>
-          <p:cNvSpPr txBox="1"/>
-          <p:nvPr/>
-        </p:nvSpPr>
-        <p:spPr>
-          <a:xfrm>
-            <a:off x="9169165" y="1171578"/>
-            <a:ext cx="2751590" cy="646331"/>
-          </a:xfrm>
-          <a:prstGeom prst="rect">
-            <a:avLst/>
-          </a:prstGeom>
-          <a:noFill/>
-        </p:spPr>
-        <p:txBody>
-          <a:bodyPr wrap="square" rtlCol="0">
-            <a:spAutoFit/>
-          </a:bodyPr>
-          <a:lstStyle/>
-          <a:p>
-            <a:pPr algn="ctr"/>
-            <a:r>
-              <a:rPr lang="en-US" dirty="0"/>
-              <a:t>Minimal tests to ensure connectivity.</a:t>
-            </a:r>
-          </a:p>
-        </p:txBody>
-      </p:sp>
-      <p:sp>
-        <p:nvSpPr>
-          <p:cNvPr id="31" name="TextBox 30">
-            <a:extLst>
-              <a:ext uri="{FF2B5EF4-FFF2-40B4-BE49-F238E27FC236}">
-                <a16:creationId xmlns:a16="http://schemas.microsoft.com/office/drawing/2014/main" id="{C302D169-5F79-451F-9777-08003BF20E06}"/>
-              </a:ext>
-            </a:extLst>
-          </p:cNvPr>
-          <p:cNvSpPr txBox="1"/>
-          <p:nvPr/>
-        </p:nvSpPr>
-        <p:spPr>
-          <a:xfrm>
-            <a:off x="5023784" y="3658167"/>
-            <a:ext cx="1402006" cy="369332"/>
-          </a:xfrm>
-          <a:prstGeom prst="rect">
-            <a:avLst/>
-          </a:prstGeom>
-          <a:solidFill>
-            <a:schemeClr val="accent2">
-              <a:lumMod val="40000"/>
-              <a:lumOff val="60000"/>
-            </a:schemeClr>
-          </a:solidFill>
-        </p:spPr>
-        <p:txBody>
-          <a:bodyPr wrap="square" rtlCol="0">
-            <a:spAutoFit/>
-          </a:bodyPr>
-          <a:lstStyle/>
-          <a:p>
-            <a:r>
-              <a:rPr lang="en-US" dirty="0"/>
-              <a:t>Smoke tests</a:t>
-            </a:r>
-          </a:p>
-        </p:txBody>
-      </p:sp>
-      <p:sp>
-        <p:nvSpPr>
-          <p:cNvPr id="32" name="TextBox 31">
-            <a:extLst>
-              <a:ext uri="{FF2B5EF4-FFF2-40B4-BE49-F238E27FC236}">
-                <a16:creationId xmlns:a16="http://schemas.microsoft.com/office/drawing/2014/main" id="{534A92F8-DB53-44DA-A358-C14DEA1F765D}"/>
-              </a:ext>
-            </a:extLst>
-          </p:cNvPr>
-          <p:cNvSpPr txBox="1"/>
-          <p:nvPr/>
-        </p:nvSpPr>
-        <p:spPr>
-          <a:xfrm>
-            <a:off x="1194130" y="3658167"/>
-            <a:ext cx="1431524" cy="369332"/>
-          </a:xfrm>
-          <a:prstGeom prst="rect">
-            <a:avLst/>
-          </a:prstGeom>
-          <a:solidFill>
-            <a:schemeClr val="accent2">
-              <a:lumMod val="40000"/>
-              <a:lumOff val="60000"/>
-            </a:schemeClr>
-          </a:solidFill>
-        </p:spPr>
-        <p:txBody>
-          <a:bodyPr wrap="square" rtlCol="0">
-            <a:spAutoFit/>
-          </a:bodyPr>
-          <a:lstStyle/>
-          <a:p>
-            <a:r>
-              <a:rPr lang="en-US" dirty="0"/>
-              <a:t>Smoke tests</a:t>
-            </a:r>
-          </a:p>
-        </p:txBody>
-      </p:sp>
-      <p:sp>
-        <p:nvSpPr>
-          <p:cNvPr id="36" name="Rectangle 35">
-            <a:extLst>
-              <a:ext uri="{FF2B5EF4-FFF2-40B4-BE49-F238E27FC236}">
-                <a16:creationId xmlns:a16="http://schemas.microsoft.com/office/drawing/2014/main" id="{B54BDD2E-396A-4FA4-A886-7BFA273C7722}"/>
-              </a:ext>
-            </a:extLst>
-          </p:cNvPr>
-          <p:cNvSpPr/>
-          <p:nvPr/>
-        </p:nvSpPr>
-        <p:spPr>
-          <a:xfrm>
-            <a:off x="534097" y="5253632"/>
-            <a:ext cx="2751590" cy="807710"/>
-          </a:xfrm>
-          <a:prstGeom prst="rect">
-            <a:avLst/>
-          </a:prstGeom>
-        </p:spPr>
-        <p:style>
-          <a:lnRef idx="2">
-            <a:schemeClr val="accent1">
-              <a:shade val="50000"/>
-            </a:schemeClr>
-          </a:lnRef>
-          <a:fillRef idx="1">
-            <a:schemeClr val="accent1"/>
-          </a:fillRef>
-          <a:effectRef idx="0">
-            <a:schemeClr val="accent1"/>
-          </a:effectRef>
-          <a:fontRef idx="minor">
-            <a:schemeClr val="lt1"/>
-          </a:fontRef>
-        </p:style>
-        <p:txBody>
-          <a:bodyPr rtlCol="0" anchor="ctr"/>
-          <a:lstStyle/>
-          <a:p>
-            <a:pPr algn="ctr"/>
-            <a:endParaRPr lang="en-US"/>
-          </a:p>
-        </p:txBody>
-      </p:sp>
-      <p:sp>
-        <p:nvSpPr>
-          <p:cNvPr id="37" name="TextBox 36">
-            <a:extLst>
-              <a:ext uri="{FF2B5EF4-FFF2-40B4-BE49-F238E27FC236}">
-                <a16:creationId xmlns:a16="http://schemas.microsoft.com/office/drawing/2014/main" id="{31289C89-F65D-457E-88CD-23818682A43C}"/>
-              </a:ext>
-            </a:extLst>
-          </p:cNvPr>
-          <p:cNvSpPr txBox="1"/>
-          <p:nvPr/>
-        </p:nvSpPr>
-        <p:spPr>
-          <a:xfrm>
-            <a:off x="492339" y="5207465"/>
-            <a:ext cx="1905346" cy="369332"/>
-          </a:xfrm>
-          <a:prstGeom prst="rect">
-            <a:avLst/>
-          </a:prstGeom>
-          <a:noFill/>
-        </p:spPr>
-        <p:txBody>
-          <a:bodyPr wrap="square" rtlCol="0">
-            <a:spAutoFit/>
-          </a:bodyPr>
-          <a:lstStyle/>
-          <a:p>
-            <a:r>
-              <a:rPr lang="en-US" dirty="0"/>
-              <a:t>Deploy to dev</a:t>
-            </a:r>
-          </a:p>
-        </p:txBody>
-      </p:sp>
-      <p:sp>
-        <p:nvSpPr>
-          <p:cNvPr id="38" name="Rectangle 37">
-            <a:extLst>
-              <a:ext uri="{FF2B5EF4-FFF2-40B4-BE49-F238E27FC236}">
-                <a16:creationId xmlns:a16="http://schemas.microsoft.com/office/drawing/2014/main" id="{F7809807-6C1B-40FB-A5C4-0EDB810F70CF}"/>
-              </a:ext>
-            </a:extLst>
-          </p:cNvPr>
-          <p:cNvSpPr/>
-          <p:nvPr/>
-        </p:nvSpPr>
-        <p:spPr>
-          <a:xfrm>
-            <a:off x="4267200" y="5253632"/>
-            <a:ext cx="2915174" cy="807710"/>
-          </a:xfrm>
-          <a:prstGeom prst="rect">
-            <a:avLst/>
-          </a:prstGeom>
-        </p:spPr>
-        <p:style>
-          <a:lnRef idx="2">
-            <a:schemeClr val="accent1">
-              <a:shade val="50000"/>
-            </a:schemeClr>
-          </a:lnRef>
-          <a:fillRef idx="1">
-            <a:schemeClr val="accent1"/>
-          </a:fillRef>
-          <a:effectRef idx="0">
-            <a:schemeClr val="accent1"/>
-          </a:effectRef>
-          <a:fontRef idx="minor">
-            <a:schemeClr val="lt1"/>
-          </a:fontRef>
-        </p:style>
-        <p:txBody>
-          <a:bodyPr rtlCol="0" anchor="ctr"/>
-          <a:lstStyle/>
-          <a:p>
-            <a:pPr algn="ctr"/>
-            <a:endParaRPr lang="en-US"/>
-          </a:p>
-        </p:txBody>
-      </p:sp>
-      <p:sp>
-        <p:nvSpPr>
-          <p:cNvPr id="39" name="TextBox 38">
-            <a:extLst>
-              <a:ext uri="{FF2B5EF4-FFF2-40B4-BE49-F238E27FC236}">
-                <a16:creationId xmlns:a16="http://schemas.microsoft.com/office/drawing/2014/main" id="{9657741D-0ED1-446C-9501-2D737ECC99A8}"/>
-              </a:ext>
-            </a:extLst>
-          </p:cNvPr>
-          <p:cNvSpPr txBox="1"/>
-          <p:nvPr/>
-        </p:nvSpPr>
-        <p:spPr>
-          <a:xfrm>
-            <a:off x="4267200" y="5269359"/>
-            <a:ext cx="1905346" cy="369332"/>
-          </a:xfrm>
-          <a:prstGeom prst="rect">
-            <a:avLst/>
-          </a:prstGeom>
-          <a:noFill/>
-        </p:spPr>
-        <p:txBody>
-          <a:bodyPr wrap="square" rtlCol="0">
-            <a:spAutoFit/>
-          </a:bodyPr>
-          <a:lstStyle/>
-          <a:p>
-            <a:r>
-              <a:rPr lang="en-US" dirty="0"/>
-              <a:t>Deploy to </a:t>
-            </a:r>
-            <a:r>
-              <a:rPr lang="en-US" dirty="0" err="1"/>
-              <a:t>qa</a:t>
-            </a:r>
-            <a:r>
-              <a:rPr lang="en-US" dirty="0"/>
-              <a:t> / </a:t>
-            </a:r>
-            <a:r>
-              <a:rPr lang="en-US" dirty="0" err="1"/>
-              <a:t>uat</a:t>
-            </a:r>
-            <a:endParaRPr lang="en-US" dirty="0"/>
-          </a:p>
-        </p:txBody>
-      </p:sp>
-      <p:sp>
-        <p:nvSpPr>
-          <p:cNvPr id="41" name="Rectangle 40">
-            <a:extLst>
-              <a:ext uri="{FF2B5EF4-FFF2-40B4-BE49-F238E27FC236}">
-                <a16:creationId xmlns:a16="http://schemas.microsoft.com/office/drawing/2014/main" id="{6346E6F0-9ECD-4392-8D61-2CBB2F136F1E}"/>
-              </a:ext>
-            </a:extLst>
-          </p:cNvPr>
-          <p:cNvSpPr/>
-          <p:nvPr/>
-        </p:nvSpPr>
-        <p:spPr>
-          <a:xfrm>
-            <a:off x="9163573" y="5253632"/>
-            <a:ext cx="2751590" cy="807710"/>
-          </a:xfrm>
-          <a:prstGeom prst="rect">
-            <a:avLst/>
-          </a:prstGeom>
-        </p:spPr>
-        <p:style>
-          <a:lnRef idx="2">
-            <a:schemeClr val="accent1">
-              <a:shade val="50000"/>
-            </a:schemeClr>
-          </a:lnRef>
-          <a:fillRef idx="1">
-            <a:schemeClr val="accent1"/>
-          </a:fillRef>
-          <a:effectRef idx="0">
-            <a:schemeClr val="accent1"/>
-          </a:effectRef>
-          <a:fontRef idx="minor">
-            <a:schemeClr val="lt1"/>
-          </a:fontRef>
-        </p:style>
-        <p:txBody>
-          <a:bodyPr rtlCol="0" anchor="ctr"/>
-          <a:lstStyle/>
-          <a:p>
-            <a:pPr algn="ctr"/>
-            <a:endParaRPr lang="en-US"/>
-          </a:p>
-        </p:txBody>
-      </p:sp>
-      <p:sp>
-        <p:nvSpPr>
-          <p:cNvPr id="43" name="TextBox 42">
-            <a:extLst>
-              <a:ext uri="{FF2B5EF4-FFF2-40B4-BE49-F238E27FC236}">
-                <a16:creationId xmlns:a16="http://schemas.microsoft.com/office/drawing/2014/main" id="{D98D0C68-7796-4A67-8CC0-8339EF9D5294}"/>
-              </a:ext>
-            </a:extLst>
-          </p:cNvPr>
-          <p:cNvSpPr txBox="1"/>
-          <p:nvPr/>
-        </p:nvSpPr>
-        <p:spPr>
-          <a:xfrm>
-            <a:off x="9113424" y="5269359"/>
-            <a:ext cx="1905346" cy="369332"/>
-          </a:xfrm>
-          <a:prstGeom prst="rect">
-            <a:avLst/>
-          </a:prstGeom>
-          <a:noFill/>
-        </p:spPr>
-        <p:txBody>
-          <a:bodyPr wrap="square" rtlCol="0">
-            <a:spAutoFit/>
-          </a:bodyPr>
-          <a:lstStyle/>
-          <a:p>
-            <a:r>
-              <a:rPr lang="en-US" dirty="0"/>
-              <a:t>Deploy to prod</a:t>
-            </a:r>
-          </a:p>
-        </p:txBody>
-      </p:sp>
-      <p:cxnSp>
-        <p:nvCxnSpPr>
-          <p:cNvPr id="51" name="Straight Arrow Connector 50">
-            <a:extLst>
-              <a:ext uri="{FF2B5EF4-FFF2-40B4-BE49-F238E27FC236}">
-                <a16:creationId xmlns:a16="http://schemas.microsoft.com/office/drawing/2014/main" id="{FAEAA835-2361-48C2-8CC7-8766BE279359}"/>
+          <p:cNvPr id="11" name="Straight Connector 10">
+            <a:extLst>
+              <a:ext uri="{FF2B5EF4-FFF2-40B4-BE49-F238E27FC236}">
+                <a16:creationId xmlns:a16="http://schemas.microsoft.com/office/drawing/2014/main" id="{7AF566BC-5FE6-4368-B70A-5DC90DCB1869}"/>
               </a:ext>
             </a:extLst>
           </p:cNvPr>
@@ -5238,264 +4041,8 @@
         </p:nvCxnSpPr>
         <p:spPr>
           <a:xfrm>
-            <a:off x="1909892" y="4721587"/>
-            <a:ext cx="0" cy="532045"/>
-          </a:xfrm>
-          <a:prstGeom prst="straightConnector1">
-            <a:avLst/>
-          </a:prstGeom>
-          <a:ln w="19050">
-            <a:solidFill>
-              <a:srgbClr val="FF0000"/>
-            </a:solidFill>
-            <a:prstDash val="dash"/>
-            <a:tailEnd type="triangle"/>
-          </a:ln>
-        </p:spPr>
-        <p:style>
-          <a:lnRef idx="3">
-            <a:schemeClr val="accent2"/>
-          </a:lnRef>
-          <a:fillRef idx="0">
-            <a:schemeClr val="accent2"/>
-          </a:fillRef>
-          <a:effectRef idx="2">
-            <a:schemeClr val="accent2"/>
-          </a:effectRef>
-          <a:fontRef idx="minor">
-            <a:schemeClr val="tx1"/>
-          </a:fontRef>
-        </p:style>
-      </p:cxnSp>
-      <p:cxnSp>
-        <p:nvCxnSpPr>
-          <p:cNvPr id="53" name="Straight Arrow Connector 52">
-            <a:extLst>
-              <a:ext uri="{FF2B5EF4-FFF2-40B4-BE49-F238E27FC236}">
-                <a16:creationId xmlns:a16="http://schemas.microsoft.com/office/drawing/2014/main" id="{0580C1EA-DAE7-49C9-95F8-BF32D2383033}"/>
-              </a:ext>
-            </a:extLst>
-          </p:cNvPr>
-          <p:cNvCxnSpPr>
-            <a:cxnSpLocks/>
-          </p:cNvCxnSpPr>
-          <p:nvPr/>
-        </p:nvCxnSpPr>
-        <p:spPr>
-          <a:xfrm>
-            <a:off x="5724787" y="4721587"/>
-            <a:ext cx="0" cy="532045"/>
-          </a:xfrm>
-          <a:prstGeom prst="straightConnector1">
-            <a:avLst/>
-          </a:prstGeom>
-          <a:ln w="19050">
-            <a:solidFill>
-              <a:srgbClr val="FF0000"/>
-            </a:solidFill>
-            <a:prstDash val="dash"/>
-            <a:tailEnd type="triangle"/>
-          </a:ln>
-        </p:spPr>
-        <p:style>
-          <a:lnRef idx="3">
-            <a:schemeClr val="accent2"/>
-          </a:lnRef>
-          <a:fillRef idx="0">
-            <a:schemeClr val="accent2"/>
-          </a:fillRef>
-          <a:effectRef idx="2">
-            <a:schemeClr val="accent2"/>
-          </a:effectRef>
-          <a:fontRef idx="minor">
-            <a:schemeClr val="tx1"/>
-          </a:fontRef>
-        </p:style>
-      </p:cxnSp>
-      <p:cxnSp>
-        <p:nvCxnSpPr>
-          <p:cNvPr id="54" name="Straight Arrow Connector 53">
-            <a:extLst>
-              <a:ext uri="{FF2B5EF4-FFF2-40B4-BE49-F238E27FC236}">
-                <a16:creationId xmlns:a16="http://schemas.microsoft.com/office/drawing/2014/main" id="{A08D732A-CCB2-4EB4-8263-BCC7C038A0B2}"/>
-              </a:ext>
-            </a:extLst>
-          </p:cNvPr>
-          <p:cNvCxnSpPr>
-            <a:cxnSpLocks/>
-          </p:cNvCxnSpPr>
-          <p:nvPr/>
-        </p:nvCxnSpPr>
-        <p:spPr>
-          <a:xfrm>
-            <a:off x="10563720" y="4721587"/>
-            <a:ext cx="0" cy="532045"/>
-          </a:xfrm>
-          <a:prstGeom prst="straightConnector1">
-            <a:avLst/>
-          </a:prstGeom>
-          <a:ln w="19050">
-            <a:solidFill>
-              <a:srgbClr val="FF0000"/>
-            </a:solidFill>
-            <a:prstDash val="dash"/>
-            <a:tailEnd type="triangle"/>
-          </a:ln>
-        </p:spPr>
-        <p:style>
-          <a:lnRef idx="3">
-            <a:schemeClr val="accent2"/>
-          </a:lnRef>
-          <a:fillRef idx="0">
-            <a:schemeClr val="accent2"/>
-          </a:fillRef>
-          <a:effectRef idx="2">
-            <a:schemeClr val="accent2"/>
-          </a:effectRef>
-          <a:fontRef idx="minor">
-            <a:schemeClr val="tx1"/>
-          </a:fontRef>
-        </p:style>
-      </p:cxnSp>
-      <p:sp>
-        <p:nvSpPr>
-          <p:cNvPr id="55" name="TextBox 54">
-            <a:extLst>
-              <a:ext uri="{FF2B5EF4-FFF2-40B4-BE49-F238E27FC236}">
-                <a16:creationId xmlns:a16="http://schemas.microsoft.com/office/drawing/2014/main" id="{ED390C73-A443-4CBB-A82D-766CB42E946E}"/>
-              </a:ext>
-            </a:extLst>
-          </p:cNvPr>
-          <p:cNvSpPr txBox="1"/>
-          <p:nvPr/>
-        </p:nvSpPr>
-        <p:spPr>
-          <a:xfrm>
-            <a:off x="1194130" y="5636075"/>
-            <a:ext cx="1431524" cy="369332"/>
-          </a:xfrm>
-          <a:prstGeom prst="rect">
-            <a:avLst/>
-          </a:prstGeom>
-          <a:solidFill>
-            <a:schemeClr val="accent2">
-              <a:lumMod val="40000"/>
-              <a:lumOff val="60000"/>
-            </a:schemeClr>
-          </a:solidFill>
-        </p:spPr>
-        <p:txBody>
-          <a:bodyPr wrap="square" rtlCol="0">
-            <a:spAutoFit/>
-          </a:bodyPr>
-          <a:lstStyle/>
-          <a:p>
-            <a:r>
-              <a:rPr lang="en-US" dirty="0"/>
-              <a:t>Smoke tests</a:t>
-            </a:r>
-          </a:p>
-        </p:txBody>
-      </p:sp>
-      <p:sp>
-        <p:nvSpPr>
-          <p:cNvPr id="56" name="TextBox 55">
-            <a:extLst>
-              <a:ext uri="{FF2B5EF4-FFF2-40B4-BE49-F238E27FC236}">
-                <a16:creationId xmlns:a16="http://schemas.microsoft.com/office/drawing/2014/main" id="{E439786C-69EF-45F7-9DBB-04D57FF52A2B}"/>
-              </a:ext>
-            </a:extLst>
-          </p:cNvPr>
-          <p:cNvSpPr txBox="1"/>
-          <p:nvPr/>
-        </p:nvSpPr>
-        <p:spPr>
-          <a:xfrm>
-            <a:off x="5009025" y="5636075"/>
-            <a:ext cx="1431524" cy="369332"/>
-          </a:xfrm>
-          <a:prstGeom prst="rect">
-            <a:avLst/>
-          </a:prstGeom>
-          <a:solidFill>
-            <a:schemeClr val="accent2">
-              <a:lumMod val="40000"/>
-              <a:lumOff val="60000"/>
-            </a:schemeClr>
-          </a:solidFill>
-        </p:spPr>
-        <p:txBody>
-          <a:bodyPr wrap="square" rtlCol="0">
-            <a:spAutoFit/>
-          </a:bodyPr>
-          <a:lstStyle/>
-          <a:p>
-            <a:r>
-              <a:rPr lang="en-US" dirty="0"/>
-              <a:t>Smoke tests</a:t>
-            </a:r>
-          </a:p>
-        </p:txBody>
-      </p:sp>
-      <p:sp>
-        <p:nvSpPr>
-          <p:cNvPr id="57" name="TextBox 56">
-            <a:extLst>
-              <a:ext uri="{FF2B5EF4-FFF2-40B4-BE49-F238E27FC236}">
-                <a16:creationId xmlns:a16="http://schemas.microsoft.com/office/drawing/2014/main" id="{A89BF356-9525-4B21-AA58-58A0BF177761}"/>
-              </a:ext>
-            </a:extLst>
-          </p:cNvPr>
-          <p:cNvSpPr txBox="1"/>
-          <p:nvPr/>
-        </p:nvSpPr>
-        <p:spPr>
-          <a:xfrm>
-            <a:off x="9823606" y="5636075"/>
-            <a:ext cx="1431524" cy="369332"/>
-          </a:xfrm>
-          <a:prstGeom prst="rect">
-            <a:avLst/>
-          </a:prstGeom>
-          <a:solidFill>
-            <a:schemeClr val="accent2">
-              <a:lumMod val="40000"/>
-              <a:lumOff val="60000"/>
-            </a:schemeClr>
-          </a:solidFill>
-        </p:spPr>
-        <p:txBody>
-          <a:bodyPr wrap="square" rtlCol="0">
-            <a:spAutoFit/>
-          </a:bodyPr>
-          <a:lstStyle/>
-          <a:p>
-            <a:r>
-              <a:rPr lang="en-US" dirty="0"/>
-              <a:t>Smoke tests</a:t>
-            </a:r>
-          </a:p>
-        </p:txBody>
-      </p:sp>
-      <p:cxnSp>
-        <p:nvCxnSpPr>
-          <p:cNvPr id="27" name="Straight Connector 26">
-            <a:extLst>
-              <a:ext uri="{FF2B5EF4-FFF2-40B4-BE49-F238E27FC236}">
-                <a16:creationId xmlns:a16="http://schemas.microsoft.com/office/drawing/2014/main" id="{A203DB08-118C-42CE-A237-1C67CB57D63D}"/>
-              </a:ext>
-            </a:extLst>
-          </p:cNvPr>
-          <p:cNvCxnSpPr>
-            <a:stCxn id="4" idx="1"/>
-            <a:endCxn id="4" idx="3"/>
-          </p:cNvCxnSpPr>
-          <p:nvPr/>
-        </p:nvCxnSpPr>
-        <p:spPr>
-          <a:xfrm>
-            <a:off x="534097" y="3383576"/>
-            <a:ext cx="2751590" cy="0"/>
+            <a:off x="4781725" y="3179428"/>
+            <a:ext cx="2374084" cy="0"/>
           </a:xfrm>
           <a:prstGeom prst="line">
             <a:avLst/>
@@ -5516,12 +4063,130 @@
           </a:fontRef>
         </p:style>
       </p:cxnSp>
-      <p:sp>
-        <p:nvSpPr>
-          <p:cNvPr id="58" name="TextBox 57">
-            <a:extLst>
-              <a:ext uri="{FF2B5EF4-FFF2-40B4-BE49-F238E27FC236}">
-                <a16:creationId xmlns:a16="http://schemas.microsoft.com/office/drawing/2014/main" id="{19F182B0-6AEF-41E4-8794-E0C0CE947738}"/>
+      <p:cxnSp>
+        <p:nvCxnSpPr>
+          <p:cNvPr id="13" name="Straight Connector 12">
+            <a:extLst>
+              <a:ext uri="{FF2B5EF4-FFF2-40B4-BE49-F238E27FC236}">
+                <a16:creationId xmlns:a16="http://schemas.microsoft.com/office/drawing/2014/main" id="{4A4F126B-9EDE-42B0-97AF-96644BBB41C1}"/>
+              </a:ext>
+            </a:extLst>
+          </p:cNvPr>
+          <p:cNvCxnSpPr>
+            <a:cxnSpLocks/>
+          </p:cNvCxnSpPr>
+          <p:nvPr/>
+        </p:nvCxnSpPr>
+        <p:spPr>
+          <a:xfrm>
+            <a:off x="4110606" y="4328719"/>
+            <a:ext cx="3716322" cy="0"/>
+          </a:xfrm>
+          <a:prstGeom prst="line">
+            <a:avLst/>
+          </a:prstGeom>
+        </p:spPr>
+        <p:style>
+          <a:lnRef idx="1">
+            <a:schemeClr val="dk1"/>
+          </a:lnRef>
+          <a:fillRef idx="0">
+            <a:schemeClr val="dk1"/>
+          </a:fillRef>
+          <a:effectRef idx="0">
+            <a:schemeClr val="dk1"/>
+          </a:effectRef>
+          <a:fontRef idx="minor">
+            <a:schemeClr val="tx1"/>
+          </a:fontRef>
+        </p:style>
+      </p:cxnSp>
+      <p:cxnSp>
+        <p:nvCxnSpPr>
+          <p:cNvPr id="14" name="Straight Connector 13">
+            <a:extLst>
+              <a:ext uri="{FF2B5EF4-FFF2-40B4-BE49-F238E27FC236}">
+                <a16:creationId xmlns:a16="http://schemas.microsoft.com/office/drawing/2014/main" id="{2085C0C7-73B7-406D-80E4-99BE5B682DFA}"/>
+              </a:ext>
+            </a:extLst>
+          </p:cNvPr>
+          <p:cNvCxnSpPr>
+            <a:cxnSpLocks/>
+          </p:cNvCxnSpPr>
+          <p:nvPr/>
+        </p:nvCxnSpPr>
+        <p:spPr>
+          <a:xfrm>
+            <a:off x="3556932" y="5310231"/>
+            <a:ext cx="4848837" cy="0"/>
+          </a:xfrm>
+          <a:prstGeom prst="line">
+            <a:avLst/>
+          </a:prstGeom>
+        </p:spPr>
+        <p:style>
+          <a:lnRef idx="1">
+            <a:schemeClr val="dk1"/>
+          </a:lnRef>
+          <a:fillRef idx="0">
+            <a:schemeClr val="dk1"/>
+          </a:fillRef>
+          <a:effectRef idx="0">
+            <a:schemeClr val="dk1"/>
+          </a:effectRef>
+          <a:fontRef idx="minor">
+            <a:schemeClr val="tx1"/>
+          </a:fontRef>
+        </p:style>
+      </p:cxnSp>
+      <p:cxnSp>
+        <p:nvCxnSpPr>
+          <p:cNvPr id="25" name="Straight Arrow Connector 24">
+            <a:extLst>
+              <a:ext uri="{FF2B5EF4-FFF2-40B4-BE49-F238E27FC236}">
+                <a16:creationId xmlns:a16="http://schemas.microsoft.com/office/drawing/2014/main" id="{738B7F89-1801-47CC-9CE2-5230E0A30AF1}"/>
+              </a:ext>
+            </a:extLst>
+          </p:cNvPr>
+          <p:cNvCxnSpPr>
+            <a:cxnSpLocks/>
+          </p:cNvCxnSpPr>
+          <p:nvPr/>
+        </p:nvCxnSpPr>
+        <p:spPr>
+          <a:xfrm>
+            <a:off x="1174459" y="1006895"/>
+            <a:ext cx="0" cy="4987763"/>
+          </a:xfrm>
+          <a:prstGeom prst="straightConnector1">
+            <a:avLst/>
+          </a:prstGeom>
+          <a:ln w="76200">
+            <a:headEnd type="triangle" w="med" len="med"/>
+            <a:tailEnd type="triangle" w="med" len="med"/>
+          </a:ln>
+        </p:spPr>
+        <p:style>
+          <a:lnRef idx="1">
+            <a:schemeClr val="accent1"/>
+          </a:lnRef>
+          <a:fillRef idx="0">
+            <a:schemeClr val="accent1"/>
+          </a:fillRef>
+          <a:effectRef idx="0">
+            <a:schemeClr val="accent1"/>
+          </a:effectRef>
+          <a:fontRef idx="minor">
+            <a:schemeClr val="tx1"/>
+          </a:fontRef>
+        </p:style>
+      </p:cxnSp>
+      <p:sp>
+        <p:nvSpPr>
+          <p:cNvPr id="26" name="TextBox 25">
+            <a:extLst>
+              <a:ext uri="{FF2B5EF4-FFF2-40B4-BE49-F238E27FC236}">
+                <a16:creationId xmlns:a16="http://schemas.microsoft.com/office/drawing/2014/main" id="{FE8D1872-FFCD-4BDC-B226-B1C1C4726E7A}"/>
               </a:ext>
             </a:extLst>
           </p:cNvPr>
@@ -5530,8 +4195,8 @@
         </p:nvSpPr>
         <p:spPr>
           <a:xfrm>
-            <a:off x="492339" y="2030209"/>
-            <a:ext cx="1905346" cy="369332"/>
+            <a:off x="1325459" y="969761"/>
+            <a:ext cx="2323751" cy="1200329"/>
           </a:xfrm>
           <a:prstGeom prst="rect">
             <a:avLst/>
@@ -5546,7 +4211,282 @@
           <a:p>
             <a:r>
               <a:rPr lang="en-US" dirty="0"/>
-              <a:t>Pre-Deployment</a:t>
+              <a:t>Fewer Test</a:t>
+            </a:r>
+            <a:br>
+              <a:rPr lang="en-US" dirty="0"/>
+            </a:br>
+            <a:r>
+              <a:rPr lang="en-US" dirty="0"/>
+              <a:t>More Integration</a:t>
+            </a:r>
+            <a:br>
+              <a:rPr lang="en-US" dirty="0"/>
+            </a:br>
+            <a:r>
+              <a:rPr lang="en-US" dirty="0"/>
+              <a:t>Slower</a:t>
+            </a:r>
+            <a:br>
+              <a:rPr lang="en-US" dirty="0"/>
+            </a:br>
+            <a:r>
+              <a:rPr lang="en-US" dirty="0"/>
+              <a:t>More Brittle</a:t>
+            </a:r>
+          </a:p>
+        </p:txBody>
+      </p:sp>
+      <p:sp>
+        <p:nvSpPr>
+          <p:cNvPr id="27" name="TextBox 26">
+            <a:extLst>
+              <a:ext uri="{FF2B5EF4-FFF2-40B4-BE49-F238E27FC236}">
+                <a16:creationId xmlns:a16="http://schemas.microsoft.com/office/drawing/2014/main" id="{D9634973-B829-4BBC-9221-894BBDD08936}"/>
+              </a:ext>
+            </a:extLst>
+          </p:cNvPr>
+          <p:cNvSpPr txBox="1"/>
+          <p:nvPr/>
+        </p:nvSpPr>
+        <p:spPr>
+          <a:xfrm>
+            <a:off x="1325460" y="4796142"/>
+            <a:ext cx="1686191" cy="1200329"/>
+          </a:xfrm>
+          <a:prstGeom prst="rect">
+            <a:avLst/>
+          </a:prstGeom>
+          <a:noFill/>
+        </p:spPr>
+        <p:txBody>
+          <a:bodyPr wrap="square" rtlCol="0">
+            <a:spAutoFit/>
+          </a:bodyPr>
+          <a:lstStyle/>
+          <a:p>
+            <a:r>
+              <a:rPr lang="en-US" dirty="0"/>
+              <a:t>More </a:t>
+            </a:r>
+            <a:r>
+              <a:rPr lang="en-US" dirty="0" smtClean="0"/>
+              <a:t>Tests</a:t>
+            </a:r>
+            <a:r>
+              <a:rPr lang="en-US" dirty="0"/>
+              <a:t/>
+            </a:r>
+            <a:br>
+              <a:rPr lang="en-US" dirty="0"/>
+            </a:br>
+            <a:r>
+              <a:rPr lang="en-US" dirty="0"/>
+              <a:t>More Isolation</a:t>
+            </a:r>
+            <a:br>
+              <a:rPr lang="en-US" dirty="0"/>
+            </a:br>
+            <a:r>
+              <a:rPr lang="en-US" dirty="0"/>
+              <a:t>Faster</a:t>
+            </a:r>
+            <a:br>
+              <a:rPr lang="en-US" dirty="0"/>
+            </a:br>
+            <a:r>
+              <a:rPr lang="en-US" dirty="0"/>
+              <a:t>Stable</a:t>
+            </a:r>
+          </a:p>
+        </p:txBody>
+      </p:sp>
+      <p:sp>
+        <p:nvSpPr>
+          <p:cNvPr id="30" name="TextBox 29">
+            <a:extLst>
+              <a:ext uri="{FF2B5EF4-FFF2-40B4-BE49-F238E27FC236}">
+                <a16:creationId xmlns:a16="http://schemas.microsoft.com/office/drawing/2014/main" id="{C3E77BDC-953A-4293-B2FB-0E7B0FB08133}"/>
+              </a:ext>
+            </a:extLst>
+          </p:cNvPr>
+          <p:cNvSpPr txBox="1"/>
+          <p:nvPr/>
+        </p:nvSpPr>
+        <p:spPr>
+          <a:xfrm>
+            <a:off x="3162643" y="386196"/>
+            <a:ext cx="5620623" cy="646331"/>
+          </a:xfrm>
+          <a:prstGeom prst="rect">
+            <a:avLst/>
+          </a:prstGeom>
+          <a:noFill/>
+        </p:spPr>
+        <p:txBody>
+          <a:bodyPr wrap="square" rtlCol="0">
+            <a:spAutoFit/>
+          </a:bodyPr>
+          <a:lstStyle/>
+          <a:p>
+            <a:pPr algn="ctr"/>
+            <a:r>
+              <a:rPr lang="en-US" sz="3600" b="1" dirty="0"/>
+              <a:t>Testing Pyramid</a:t>
+            </a:r>
+          </a:p>
+        </p:txBody>
+      </p:sp>
+      <p:cxnSp>
+        <p:nvCxnSpPr>
+          <p:cNvPr id="15" name="Straight Arrow Connector 14">
+            <a:extLst>
+              <a:ext uri="{FF2B5EF4-FFF2-40B4-BE49-F238E27FC236}">
+                <a16:creationId xmlns:a16="http://schemas.microsoft.com/office/drawing/2014/main" id="{4E71C545-BFC9-4D09-93B5-2E74F62C49D9}"/>
+              </a:ext>
+            </a:extLst>
+          </p:cNvPr>
+          <p:cNvCxnSpPr>
+            <a:cxnSpLocks/>
+          </p:cNvCxnSpPr>
+          <p:nvPr/>
+        </p:nvCxnSpPr>
+        <p:spPr>
+          <a:xfrm>
+            <a:off x="9473868" y="4328719"/>
+            <a:ext cx="0" cy="1628805"/>
+          </a:xfrm>
+          <a:prstGeom prst="straightConnector1">
+            <a:avLst/>
+          </a:prstGeom>
+          <a:ln w="76200">
+            <a:headEnd type="triangle" w="med" len="med"/>
+            <a:tailEnd type="triangle" w="med" len="med"/>
+          </a:ln>
+        </p:spPr>
+        <p:style>
+          <a:lnRef idx="1">
+            <a:schemeClr val="accent1"/>
+          </a:lnRef>
+          <a:fillRef idx="0">
+            <a:schemeClr val="accent1"/>
+          </a:fillRef>
+          <a:effectRef idx="0">
+            <a:schemeClr val="accent1"/>
+          </a:effectRef>
+          <a:fontRef idx="minor">
+            <a:schemeClr val="tx1"/>
+          </a:fontRef>
+        </p:style>
+      </p:cxnSp>
+      <p:cxnSp>
+        <p:nvCxnSpPr>
+          <p:cNvPr id="16" name="Straight Arrow Connector 15">
+            <a:extLst>
+              <a:ext uri="{FF2B5EF4-FFF2-40B4-BE49-F238E27FC236}">
+                <a16:creationId xmlns:a16="http://schemas.microsoft.com/office/drawing/2014/main" id="{82E1482F-4302-4732-8F8C-078628F27234}"/>
+              </a:ext>
+            </a:extLst>
+          </p:cNvPr>
+          <p:cNvCxnSpPr>
+            <a:cxnSpLocks/>
+          </p:cNvCxnSpPr>
+          <p:nvPr/>
+        </p:nvCxnSpPr>
+        <p:spPr>
+          <a:xfrm>
+            <a:off x="9466489" y="969761"/>
+            <a:ext cx="0" cy="3358958"/>
+          </a:xfrm>
+          <a:prstGeom prst="straightConnector1">
+            <a:avLst/>
+          </a:prstGeom>
+          <a:ln w="76200">
+            <a:headEnd type="triangle" w="med" len="med"/>
+            <a:tailEnd type="triangle" w="med" len="med"/>
+          </a:ln>
+        </p:spPr>
+        <p:style>
+          <a:lnRef idx="1">
+            <a:schemeClr val="accent1"/>
+          </a:lnRef>
+          <a:fillRef idx="0">
+            <a:schemeClr val="accent1"/>
+          </a:fillRef>
+          <a:effectRef idx="0">
+            <a:schemeClr val="accent1"/>
+          </a:effectRef>
+          <a:fontRef idx="minor">
+            <a:schemeClr val="tx1"/>
+          </a:fontRef>
+        </p:style>
+      </p:cxnSp>
+      <p:sp>
+        <p:nvSpPr>
+          <p:cNvPr id="18" name="TextBox 17">
+            <a:extLst>
+              <a:ext uri="{FF2B5EF4-FFF2-40B4-BE49-F238E27FC236}">
+                <a16:creationId xmlns:a16="http://schemas.microsoft.com/office/drawing/2014/main" id="{8481BE7A-4437-4BCE-A5D4-170A969DF60A}"/>
+              </a:ext>
+            </a:extLst>
+          </p:cNvPr>
+          <p:cNvSpPr txBox="1"/>
+          <p:nvPr/>
+        </p:nvSpPr>
+        <p:spPr>
+          <a:xfrm>
+            <a:off x="9530478" y="2168277"/>
+            <a:ext cx="2323751" cy="369332"/>
+          </a:xfrm>
+          <a:prstGeom prst="rect">
+            <a:avLst/>
+          </a:prstGeom>
+          <a:noFill/>
+        </p:spPr>
+        <p:txBody>
+          <a:bodyPr wrap="square" rtlCol="0">
+            <a:spAutoFit/>
+          </a:bodyPr>
+          <a:lstStyle/>
+          <a:p>
+            <a:r>
+              <a:rPr lang="en-US" dirty="0"/>
+              <a:t>Post Deployment</a:t>
+            </a:r>
+          </a:p>
+        </p:txBody>
+      </p:sp>
+      <p:sp>
+        <p:nvSpPr>
+          <p:cNvPr id="19" name="TextBox 18">
+            <a:extLst>
+              <a:ext uri="{FF2B5EF4-FFF2-40B4-BE49-F238E27FC236}">
+                <a16:creationId xmlns:a16="http://schemas.microsoft.com/office/drawing/2014/main" id="{740DA599-2073-4961-8192-2D3D5B783E12}"/>
+              </a:ext>
+            </a:extLst>
+          </p:cNvPr>
+          <p:cNvSpPr txBox="1"/>
+          <p:nvPr/>
+        </p:nvSpPr>
+        <p:spPr>
+          <a:xfrm>
+            <a:off x="9530478" y="4974036"/>
+            <a:ext cx="2323751" cy="369332"/>
+          </a:xfrm>
+          <a:prstGeom prst="rect">
+            <a:avLst/>
+          </a:prstGeom>
+          <a:noFill/>
+        </p:spPr>
+        <p:txBody>
+          <a:bodyPr wrap="square" rtlCol="0">
+            <a:spAutoFit/>
+          </a:bodyPr>
+          <a:lstStyle/>
+          <a:p>
+            <a:r>
+              <a:rPr lang="en-US" dirty="0"/>
+              <a:t>Pre Deployment</a:t>
             </a:r>
           </a:p>
         </p:txBody>
@@ -5554,7 +4494,7 @@
     </p:spTree>
     <p:extLst>
       <p:ext uri="{BB962C8B-B14F-4D97-AF65-F5344CB8AC3E}">
-        <p14:creationId xmlns:p14="http://schemas.microsoft.com/office/powerpoint/2010/main" val="218559825"/>
+        <p14:creationId xmlns:p14="http://schemas.microsoft.com/office/powerpoint/2010/main" val="219039541"/>
       </p:ext>
     </p:extLst>
   </p:cSld>
@@ -5581,6 +4521,1580 @@
           <a:chExt cx="0" cy="0"/>
         </a:xfrm>
       </p:grpSpPr>
+      <p:sp>
+        <p:nvSpPr>
+          <p:cNvPr id="21" name="Rectangle 20">
+            <a:extLst>
+              <a:ext uri="{FF2B5EF4-FFF2-40B4-BE49-F238E27FC236}">
+                <a16:creationId xmlns:a16="http://schemas.microsoft.com/office/drawing/2014/main" id="{E51017CA-40ED-4CBA-8DC5-FD96CB212950}"/>
+              </a:ext>
+            </a:extLst>
+          </p:cNvPr>
+          <p:cNvSpPr/>
+          <p:nvPr/>
+        </p:nvSpPr>
+        <p:spPr>
+          <a:xfrm>
+            <a:off x="4271395" y="2044232"/>
+            <a:ext cx="2906785" cy="2678688"/>
+          </a:xfrm>
+          <a:prstGeom prst="rect">
+            <a:avLst/>
+          </a:prstGeom>
+        </p:spPr>
+        <p:style>
+          <a:lnRef idx="2">
+            <a:schemeClr val="accent1">
+              <a:shade val="50000"/>
+            </a:schemeClr>
+          </a:lnRef>
+          <a:fillRef idx="1">
+            <a:schemeClr val="accent1"/>
+          </a:fillRef>
+          <a:effectRef idx="0">
+            <a:schemeClr val="accent1"/>
+          </a:effectRef>
+          <a:fontRef idx="minor">
+            <a:schemeClr val="lt1"/>
+          </a:fontRef>
+        </p:style>
+        <p:txBody>
+          <a:bodyPr rtlCol="0" anchor="ctr"/>
+          <a:lstStyle/>
+          <a:p>
+            <a:pPr algn="ctr"/>
+            <a:endParaRPr lang="en-US"/>
+          </a:p>
+        </p:txBody>
+      </p:sp>
+      <p:sp>
+        <p:nvSpPr>
+          <p:cNvPr id="22" name="Rectangle 21">
+            <a:extLst>
+              <a:ext uri="{FF2B5EF4-FFF2-40B4-BE49-F238E27FC236}">
+                <a16:creationId xmlns:a16="http://schemas.microsoft.com/office/drawing/2014/main" id="{89677ACD-2187-4AB3-A199-5B9F642C71A3}"/>
+              </a:ext>
+            </a:extLst>
+          </p:cNvPr>
+          <p:cNvSpPr/>
+          <p:nvPr/>
+        </p:nvSpPr>
+        <p:spPr>
+          <a:xfrm>
+            <a:off x="9163573" y="2044231"/>
+            <a:ext cx="2751590" cy="2678688"/>
+          </a:xfrm>
+          <a:prstGeom prst="rect">
+            <a:avLst/>
+          </a:prstGeom>
+        </p:spPr>
+        <p:style>
+          <a:lnRef idx="2">
+            <a:schemeClr val="accent1">
+              <a:shade val="50000"/>
+            </a:schemeClr>
+          </a:lnRef>
+          <a:fillRef idx="1">
+            <a:schemeClr val="accent1"/>
+          </a:fillRef>
+          <a:effectRef idx="0">
+            <a:schemeClr val="accent1"/>
+          </a:effectRef>
+          <a:fontRef idx="minor">
+            <a:schemeClr val="lt1"/>
+          </a:fontRef>
+        </p:style>
+        <p:txBody>
+          <a:bodyPr rtlCol="0" anchor="ctr"/>
+          <a:lstStyle/>
+          <a:p>
+            <a:pPr algn="ctr"/>
+            <a:endParaRPr lang="en-US"/>
+          </a:p>
+        </p:txBody>
+      </p:sp>
+      <p:sp>
+        <p:nvSpPr>
+          <p:cNvPr id="4" name="Rectangle 3">
+            <a:extLst>
+              <a:ext uri="{FF2B5EF4-FFF2-40B4-BE49-F238E27FC236}">
+                <a16:creationId xmlns:a16="http://schemas.microsoft.com/office/drawing/2014/main" id="{3293DE28-5051-44B7-9707-028FB246F8DE}"/>
+              </a:ext>
+            </a:extLst>
+          </p:cNvPr>
+          <p:cNvSpPr/>
+          <p:nvPr/>
+        </p:nvSpPr>
+        <p:spPr>
+          <a:xfrm>
+            <a:off x="534097" y="2044232"/>
+            <a:ext cx="2751590" cy="2678688"/>
+          </a:xfrm>
+          <a:prstGeom prst="rect">
+            <a:avLst/>
+          </a:prstGeom>
+        </p:spPr>
+        <p:style>
+          <a:lnRef idx="2">
+            <a:schemeClr val="accent1">
+              <a:shade val="50000"/>
+            </a:schemeClr>
+          </a:lnRef>
+          <a:fillRef idx="1">
+            <a:schemeClr val="accent1"/>
+          </a:fillRef>
+          <a:effectRef idx="0">
+            <a:schemeClr val="accent1"/>
+          </a:effectRef>
+          <a:fontRef idx="minor">
+            <a:schemeClr val="lt1"/>
+          </a:fontRef>
+        </p:style>
+        <p:txBody>
+          <a:bodyPr rtlCol="0" anchor="ctr"/>
+          <a:lstStyle/>
+          <a:p>
+            <a:pPr algn="ctr"/>
+            <a:endParaRPr lang="en-US"/>
+          </a:p>
+        </p:txBody>
+      </p:sp>
+      <p:sp>
+        <p:nvSpPr>
+          <p:cNvPr id="8" name="TextBox 7">
+            <a:extLst>
+              <a:ext uri="{FF2B5EF4-FFF2-40B4-BE49-F238E27FC236}">
+                <a16:creationId xmlns:a16="http://schemas.microsoft.com/office/drawing/2014/main" id="{94AFC469-9708-4612-9789-5C85ECC85483}"/>
+              </a:ext>
+            </a:extLst>
+          </p:cNvPr>
+          <p:cNvSpPr txBox="1"/>
+          <p:nvPr/>
+        </p:nvSpPr>
+        <p:spPr>
+          <a:xfrm>
+            <a:off x="1540263" y="2416028"/>
+            <a:ext cx="739259" cy="369332"/>
+          </a:xfrm>
+          <a:prstGeom prst="rect">
+            <a:avLst/>
+          </a:prstGeom>
+          <a:solidFill>
+            <a:schemeClr val="accent4"/>
+          </a:solidFill>
+        </p:spPr>
+        <p:txBody>
+          <a:bodyPr wrap="square" rtlCol="0">
+            <a:spAutoFit/>
+          </a:bodyPr>
+          <a:lstStyle/>
+          <a:p>
+            <a:r>
+              <a:rPr lang="en-US" dirty="0"/>
+              <a:t>Build</a:t>
+            </a:r>
+          </a:p>
+        </p:txBody>
+      </p:sp>
+      <p:sp>
+        <p:nvSpPr>
+          <p:cNvPr id="9" name="TextBox 8">
+            <a:extLst>
+              <a:ext uri="{FF2B5EF4-FFF2-40B4-BE49-F238E27FC236}">
+                <a16:creationId xmlns:a16="http://schemas.microsoft.com/office/drawing/2014/main" id="{E00D4313-AA02-489F-B655-6E88FFBFA87D}"/>
+              </a:ext>
+            </a:extLst>
+          </p:cNvPr>
+          <p:cNvSpPr txBox="1"/>
+          <p:nvPr/>
+        </p:nvSpPr>
+        <p:spPr>
+          <a:xfrm>
+            <a:off x="1159077" y="2828919"/>
+            <a:ext cx="1501630" cy="369332"/>
+          </a:xfrm>
+          <a:prstGeom prst="rect">
+            <a:avLst/>
+          </a:prstGeom>
+          <a:solidFill>
+            <a:schemeClr val="accent2">
+              <a:lumMod val="40000"/>
+              <a:lumOff val="60000"/>
+            </a:schemeClr>
+          </a:solidFill>
+        </p:spPr>
+        <p:txBody>
+          <a:bodyPr wrap="square" rtlCol="0">
+            <a:spAutoFit/>
+          </a:bodyPr>
+          <a:lstStyle>
+            <a:defPPr>
+              <a:defRPr lang="en-US"/>
+            </a:defPPr>
+          </a:lstStyle>
+          <a:p>
+            <a:r>
+              <a:rPr lang="en-US" dirty="0"/>
+              <a:t>Unit/Int. tests</a:t>
+            </a:r>
+          </a:p>
+        </p:txBody>
+      </p:sp>
+      <p:sp>
+        <p:nvSpPr>
+          <p:cNvPr id="10" name="TextBox 9">
+            <a:extLst>
+              <a:ext uri="{FF2B5EF4-FFF2-40B4-BE49-F238E27FC236}">
+                <a16:creationId xmlns:a16="http://schemas.microsoft.com/office/drawing/2014/main" id="{017F682C-BC3C-46B6-ADCE-834E38109D89}"/>
+              </a:ext>
+            </a:extLst>
+          </p:cNvPr>
+          <p:cNvSpPr txBox="1"/>
+          <p:nvPr/>
+        </p:nvSpPr>
+        <p:spPr>
+          <a:xfrm>
+            <a:off x="492339" y="3316741"/>
+            <a:ext cx="1905346" cy="369332"/>
+          </a:xfrm>
+          <a:prstGeom prst="rect">
+            <a:avLst/>
+          </a:prstGeom>
+          <a:noFill/>
+        </p:spPr>
+        <p:txBody>
+          <a:bodyPr wrap="square" rtlCol="0">
+            <a:spAutoFit/>
+          </a:bodyPr>
+          <a:lstStyle/>
+          <a:p>
+            <a:r>
+              <a:rPr lang="en-US" dirty="0"/>
+              <a:t>Deploy to dev slot</a:t>
+            </a:r>
+          </a:p>
+        </p:txBody>
+      </p:sp>
+      <p:sp>
+        <p:nvSpPr>
+          <p:cNvPr id="13" name="TextBox 12">
+            <a:extLst>
+              <a:ext uri="{FF2B5EF4-FFF2-40B4-BE49-F238E27FC236}">
+                <a16:creationId xmlns:a16="http://schemas.microsoft.com/office/drawing/2014/main" id="{B591B7B9-6140-466D-ABAD-AA8D6EABAB0C}"/>
+              </a:ext>
+            </a:extLst>
+          </p:cNvPr>
+          <p:cNvSpPr txBox="1"/>
+          <p:nvPr/>
+        </p:nvSpPr>
+        <p:spPr>
+          <a:xfrm>
+            <a:off x="4271222" y="2038352"/>
+            <a:ext cx="2541864" cy="369332"/>
+          </a:xfrm>
+          <a:prstGeom prst="rect">
+            <a:avLst/>
+          </a:prstGeom>
+          <a:noFill/>
+        </p:spPr>
+        <p:txBody>
+          <a:bodyPr wrap="square" rtlCol="0">
+            <a:spAutoFit/>
+          </a:bodyPr>
+          <a:lstStyle/>
+          <a:p>
+            <a:r>
+              <a:rPr lang="en-US" dirty="0"/>
+              <a:t>Deploy to QA/UAT slot</a:t>
+            </a:r>
+          </a:p>
+        </p:txBody>
+      </p:sp>
+      <p:sp>
+        <p:nvSpPr>
+          <p:cNvPr id="14" name="TextBox 13">
+            <a:extLst>
+              <a:ext uri="{FF2B5EF4-FFF2-40B4-BE49-F238E27FC236}">
+                <a16:creationId xmlns:a16="http://schemas.microsoft.com/office/drawing/2014/main" id="{CCFD35FD-8076-4FA0-B05B-8AA7D57D76D1}"/>
+              </a:ext>
+            </a:extLst>
+          </p:cNvPr>
+          <p:cNvSpPr txBox="1"/>
+          <p:nvPr/>
+        </p:nvSpPr>
+        <p:spPr>
+          <a:xfrm>
+            <a:off x="4475872" y="4078933"/>
+            <a:ext cx="2483142" cy="584775"/>
+          </a:xfrm>
+          <a:prstGeom prst="rect">
+            <a:avLst/>
+          </a:prstGeom>
+          <a:solidFill>
+            <a:schemeClr val="accent2">
+              <a:lumMod val="40000"/>
+              <a:lumOff val="60000"/>
+            </a:schemeClr>
+          </a:solidFill>
+        </p:spPr>
+        <p:txBody>
+          <a:bodyPr wrap="square" rtlCol="0">
+            <a:spAutoFit/>
+          </a:bodyPr>
+          <a:lstStyle/>
+          <a:p>
+            <a:r>
+              <a:rPr lang="en-US" sz="1600" dirty="0"/>
+              <a:t>Functional, Load</a:t>
+            </a:r>
+            <a:br>
+              <a:rPr lang="en-US" sz="1600" dirty="0"/>
+            </a:br>
+            <a:r>
+              <a:rPr lang="en-US" sz="1600" dirty="0"/>
+              <a:t>Performance, End to End</a:t>
+            </a:r>
+            <a:endParaRPr lang="en-US" dirty="0"/>
+          </a:p>
+        </p:txBody>
+      </p:sp>
+      <p:sp>
+        <p:nvSpPr>
+          <p:cNvPr id="16" name="TextBox 15">
+            <a:extLst>
+              <a:ext uri="{FF2B5EF4-FFF2-40B4-BE49-F238E27FC236}">
+                <a16:creationId xmlns:a16="http://schemas.microsoft.com/office/drawing/2014/main" id="{A966F983-30A3-469E-B0F0-9873CED87A3B}"/>
+              </a:ext>
+            </a:extLst>
+          </p:cNvPr>
+          <p:cNvSpPr txBox="1"/>
+          <p:nvPr/>
+        </p:nvSpPr>
+        <p:spPr>
+          <a:xfrm>
+            <a:off x="9163572" y="2066482"/>
+            <a:ext cx="2013326" cy="369332"/>
+          </a:xfrm>
+          <a:prstGeom prst="rect">
+            <a:avLst/>
+          </a:prstGeom>
+          <a:noFill/>
+        </p:spPr>
+        <p:txBody>
+          <a:bodyPr wrap="square" rtlCol="0">
+            <a:spAutoFit/>
+          </a:bodyPr>
+          <a:lstStyle/>
+          <a:p>
+            <a:r>
+              <a:rPr lang="en-US" dirty="0"/>
+              <a:t>Deploy to Prod slot</a:t>
+            </a:r>
+          </a:p>
+        </p:txBody>
+      </p:sp>
+      <p:sp>
+        <p:nvSpPr>
+          <p:cNvPr id="17" name="TextBox 16">
+            <a:extLst>
+              <a:ext uri="{FF2B5EF4-FFF2-40B4-BE49-F238E27FC236}">
+                <a16:creationId xmlns:a16="http://schemas.microsoft.com/office/drawing/2014/main" id="{95B59D1C-A871-44F9-906B-05BB681E6FFC}"/>
+              </a:ext>
+            </a:extLst>
+          </p:cNvPr>
+          <p:cNvSpPr txBox="1"/>
+          <p:nvPr/>
+        </p:nvSpPr>
+        <p:spPr>
+          <a:xfrm>
+            <a:off x="9838365" y="3658167"/>
+            <a:ext cx="1402006" cy="369332"/>
+          </a:xfrm>
+          <a:prstGeom prst="rect">
+            <a:avLst/>
+          </a:prstGeom>
+          <a:solidFill>
+            <a:schemeClr val="accent2">
+              <a:lumMod val="40000"/>
+              <a:lumOff val="60000"/>
+            </a:schemeClr>
+          </a:solidFill>
+        </p:spPr>
+        <p:txBody>
+          <a:bodyPr wrap="square" rtlCol="0">
+            <a:spAutoFit/>
+          </a:bodyPr>
+          <a:lstStyle/>
+          <a:p>
+            <a:r>
+              <a:rPr lang="en-US" dirty="0"/>
+              <a:t>Smoke tests</a:t>
+            </a:r>
+          </a:p>
+        </p:txBody>
+      </p:sp>
+      <p:sp>
+        <p:nvSpPr>
+          <p:cNvPr id="24" name="TextBox 23">
+            <a:extLst>
+              <a:ext uri="{FF2B5EF4-FFF2-40B4-BE49-F238E27FC236}">
+                <a16:creationId xmlns:a16="http://schemas.microsoft.com/office/drawing/2014/main" id="{50DA781A-8537-47EA-97F0-8708F15C1582}"/>
+              </a:ext>
+            </a:extLst>
+          </p:cNvPr>
+          <p:cNvSpPr txBox="1"/>
+          <p:nvPr/>
+        </p:nvSpPr>
+        <p:spPr>
+          <a:xfrm>
+            <a:off x="4973972" y="2416029"/>
+            <a:ext cx="1501630" cy="369332"/>
+          </a:xfrm>
+          <a:prstGeom prst="rect">
+            <a:avLst/>
+          </a:prstGeom>
+          <a:solidFill>
+            <a:schemeClr val="accent4"/>
+          </a:solidFill>
+        </p:spPr>
+        <p:txBody>
+          <a:bodyPr wrap="square" rtlCol="0">
+            <a:spAutoFit/>
+          </a:bodyPr>
+          <a:lstStyle>
+            <a:defPPr>
+              <a:defRPr lang="en-US"/>
+            </a:defPPr>
+          </a:lstStyle>
+          <a:p>
+            <a:r>
+              <a:rPr lang="en-US" dirty="0"/>
+              <a:t>Original Build</a:t>
+            </a:r>
+          </a:p>
+        </p:txBody>
+      </p:sp>
+      <p:sp>
+        <p:nvSpPr>
+          <p:cNvPr id="26" name="TextBox 25">
+            <a:extLst>
+              <a:ext uri="{FF2B5EF4-FFF2-40B4-BE49-F238E27FC236}">
+                <a16:creationId xmlns:a16="http://schemas.microsoft.com/office/drawing/2014/main" id="{FAD39E70-8356-4606-84D6-E90D4C5E0B2B}"/>
+              </a:ext>
+            </a:extLst>
+          </p:cNvPr>
+          <p:cNvSpPr txBox="1"/>
+          <p:nvPr/>
+        </p:nvSpPr>
+        <p:spPr>
+          <a:xfrm>
+            <a:off x="9788553" y="2426661"/>
+            <a:ext cx="1501630" cy="369332"/>
+          </a:xfrm>
+          <a:prstGeom prst="rect">
+            <a:avLst/>
+          </a:prstGeom>
+          <a:solidFill>
+            <a:schemeClr val="accent4"/>
+          </a:solidFill>
+        </p:spPr>
+        <p:txBody>
+          <a:bodyPr wrap="square" rtlCol="0">
+            <a:spAutoFit/>
+          </a:bodyPr>
+          <a:lstStyle/>
+          <a:p>
+            <a:r>
+              <a:rPr lang="en-US" dirty="0"/>
+              <a:t>Original Build</a:t>
+            </a:r>
+          </a:p>
+        </p:txBody>
+      </p:sp>
+      <p:cxnSp>
+        <p:nvCxnSpPr>
+          <p:cNvPr id="35" name="Straight Arrow Connector 34">
+            <a:extLst>
+              <a:ext uri="{FF2B5EF4-FFF2-40B4-BE49-F238E27FC236}">
+                <a16:creationId xmlns:a16="http://schemas.microsoft.com/office/drawing/2014/main" id="{3819DC03-FE8A-477C-A48A-4A005646E848}"/>
+              </a:ext>
+            </a:extLst>
+          </p:cNvPr>
+          <p:cNvCxnSpPr>
+            <a:cxnSpLocks/>
+            <a:stCxn id="38" idx="3"/>
+            <a:endCxn id="22" idx="1"/>
+          </p:cNvCxnSpPr>
+          <p:nvPr/>
+        </p:nvCxnSpPr>
+        <p:spPr>
+          <a:xfrm flipV="1">
+            <a:off x="7182374" y="3383575"/>
+            <a:ext cx="1981199" cy="2273912"/>
+          </a:xfrm>
+          <a:prstGeom prst="straightConnector1">
+            <a:avLst/>
+          </a:prstGeom>
+          <a:ln w="19050">
+            <a:solidFill>
+              <a:srgbClr val="FF0000"/>
+            </a:solidFill>
+            <a:prstDash val="dash"/>
+            <a:tailEnd type="triangle"/>
+          </a:ln>
+        </p:spPr>
+        <p:style>
+          <a:lnRef idx="3">
+            <a:schemeClr val="accent2"/>
+          </a:lnRef>
+          <a:fillRef idx="0">
+            <a:schemeClr val="accent2"/>
+          </a:fillRef>
+          <a:effectRef idx="2">
+            <a:schemeClr val="accent2"/>
+          </a:effectRef>
+          <a:fontRef idx="minor">
+            <a:schemeClr val="tx1"/>
+          </a:fontRef>
+        </p:style>
+      </p:cxnSp>
+      <p:cxnSp>
+        <p:nvCxnSpPr>
+          <p:cNvPr id="40" name="Straight Arrow Connector 39">
+            <a:extLst>
+              <a:ext uri="{FF2B5EF4-FFF2-40B4-BE49-F238E27FC236}">
+                <a16:creationId xmlns:a16="http://schemas.microsoft.com/office/drawing/2014/main" id="{FC129F2E-6AB2-4299-971F-ECEDA7019217}"/>
+              </a:ext>
+            </a:extLst>
+          </p:cNvPr>
+          <p:cNvCxnSpPr>
+            <a:cxnSpLocks/>
+            <a:stCxn id="36" idx="3"/>
+          </p:cNvCxnSpPr>
+          <p:nvPr/>
+        </p:nvCxnSpPr>
+        <p:spPr>
+          <a:xfrm flipV="1">
+            <a:off x="3285687" y="3429001"/>
+            <a:ext cx="981510" cy="2228486"/>
+          </a:xfrm>
+          <a:prstGeom prst="straightConnector1">
+            <a:avLst/>
+          </a:prstGeom>
+          <a:ln w="19050">
+            <a:solidFill>
+              <a:srgbClr val="FF0000"/>
+            </a:solidFill>
+            <a:prstDash val="dash"/>
+            <a:tailEnd type="triangle"/>
+          </a:ln>
+        </p:spPr>
+        <p:style>
+          <a:lnRef idx="3">
+            <a:schemeClr val="accent2"/>
+          </a:lnRef>
+          <a:fillRef idx="0">
+            <a:schemeClr val="accent2"/>
+          </a:fillRef>
+          <a:effectRef idx="2">
+            <a:schemeClr val="accent2"/>
+          </a:effectRef>
+          <a:fontRef idx="minor">
+            <a:schemeClr val="tx1"/>
+          </a:fontRef>
+        </p:style>
+      </p:cxnSp>
+      <p:sp>
+        <p:nvSpPr>
+          <p:cNvPr id="42" name="TextBox 41">
+            <a:extLst>
+              <a:ext uri="{FF2B5EF4-FFF2-40B4-BE49-F238E27FC236}">
+                <a16:creationId xmlns:a16="http://schemas.microsoft.com/office/drawing/2014/main" id="{FF214A27-0C69-4B65-9137-903F15CF1452}"/>
+              </a:ext>
+            </a:extLst>
+          </p:cNvPr>
+          <p:cNvSpPr txBox="1"/>
+          <p:nvPr/>
+        </p:nvSpPr>
+        <p:spPr>
+          <a:xfrm>
+            <a:off x="7629094" y="4353587"/>
+            <a:ext cx="1126218" cy="369332"/>
+          </a:xfrm>
+          <a:prstGeom prst="rect">
+            <a:avLst/>
+          </a:prstGeom>
+          <a:solidFill>
+            <a:schemeClr val="accent6">
+              <a:lumMod val="60000"/>
+              <a:lumOff val="40000"/>
+            </a:schemeClr>
+          </a:solidFill>
+        </p:spPr>
+        <p:txBody>
+          <a:bodyPr wrap="square" rtlCol="0">
+            <a:spAutoFit/>
+          </a:bodyPr>
+          <a:lstStyle/>
+          <a:p>
+            <a:r>
+              <a:rPr lang="en-US" dirty="0"/>
+              <a:t>Approval</a:t>
+            </a:r>
+          </a:p>
+        </p:txBody>
+      </p:sp>
+      <p:sp>
+        <p:nvSpPr>
+          <p:cNvPr id="44" name="TextBox 43">
+            <a:extLst>
+              <a:ext uri="{FF2B5EF4-FFF2-40B4-BE49-F238E27FC236}">
+                <a16:creationId xmlns:a16="http://schemas.microsoft.com/office/drawing/2014/main" id="{F37BE299-E622-495B-B75D-DCDFF2576F6B}"/>
+              </a:ext>
+            </a:extLst>
+          </p:cNvPr>
+          <p:cNvSpPr txBox="1"/>
+          <p:nvPr/>
+        </p:nvSpPr>
+        <p:spPr>
+          <a:xfrm>
+            <a:off x="173373" y="67882"/>
+            <a:ext cx="9314576" cy="646331"/>
+          </a:xfrm>
+          <a:prstGeom prst="rect">
+            <a:avLst/>
+          </a:prstGeom>
+          <a:noFill/>
+        </p:spPr>
+        <p:txBody>
+          <a:bodyPr wrap="square" rtlCol="0">
+            <a:spAutoFit/>
+          </a:bodyPr>
+          <a:lstStyle/>
+          <a:p>
+            <a:r>
+              <a:rPr lang="en-US" sz="3600" dirty="0"/>
+              <a:t>CI-CD with gated testing   </a:t>
+            </a:r>
+            <a:r>
+              <a:rPr lang="en-US" sz="2000" dirty="0"/>
+              <a:t>Build once test many.</a:t>
+            </a:r>
+            <a:endParaRPr lang="en-US" sz="3600" dirty="0"/>
+          </a:p>
+        </p:txBody>
+      </p:sp>
+      <p:sp>
+        <p:nvSpPr>
+          <p:cNvPr id="45" name="TextBox 44">
+            <a:extLst>
+              <a:ext uri="{FF2B5EF4-FFF2-40B4-BE49-F238E27FC236}">
+                <a16:creationId xmlns:a16="http://schemas.microsoft.com/office/drawing/2014/main" id="{67654F9F-410B-4ECC-8AA8-2C82A7D3C948}"/>
+              </a:ext>
+            </a:extLst>
+          </p:cNvPr>
+          <p:cNvSpPr txBox="1"/>
+          <p:nvPr/>
+        </p:nvSpPr>
+        <p:spPr>
+          <a:xfrm>
+            <a:off x="534097" y="710556"/>
+            <a:ext cx="2751590" cy="646331"/>
+          </a:xfrm>
+          <a:prstGeom prst="rect">
+            <a:avLst/>
+          </a:prstGeom>
+          <a:noFill/>
+        </p:spPr>
+        <p:txBody>
+          <a:bodyPr wrap="square" rtlCol="0">
+            <a:spAutoFit/>
+          </a:bodyPr>
+          <a:lstStyle/>
+          <a:p>
+            <a:pPr algn="ctr"/>
+            <a:r>
+              <a:rPr lang="en-US" sz="3600" dirty="0"/>
+              <a:t>Dev</a:t>
+            </a:r>
+          </a:p>
+        </p:txBody>
+      </p:sp>
+      <p:sp>
+        <p:nvSpPr>
+          <p:cNvPr id="46" name="TextBox 45">
+            <a:extLst>
+              <a:ext uri="{FF2B5EF4-FFF2-40B4-BE49-F238E27FC236}">
+                <a16:creationId xmlns:a16="http://schemas.microsoft.com/office/drawing/2014/main" id="{FCEAA835-0ED4-463A-9E9A-67DEFBA46D10}"/>
+              </a:ext>
+            </a:extLst>
+          </p:cNvPr>
+          <p:cNvSpPr txBox="1"/>
+          <p:nvPr/>
+        </p:nvSpPr>
+        <p:spPr>
+          <a:xfrm>
+            <a:off x="4278211" y="710556"/>
+            <a:ext cx="2904163" cy="646331"/>
+          </a:xfrm>
+          <a:prstGeom prst="rect">
+            <a:avLst/>
+          </a:prstGeom>
+          <a:noFill/>
+        </p:spPr>
+        <p:txBody>
+          <a:bodyPr wrap="square" rtlCol="0">
+            <a:spAutoFit/>
+          </a:bodyPr>
+          <a:lstStyle/>
+          <a:p>
+            <a:pPr algn="ctr"/>
+            <a:r>
+              <a:rPr lang="en-US" sz="3600" dirty="0"/>
+              <a:t>QA / UAT</a:t>
+            </a:r>
+          </a:p>
+        </p:txBody>
+      </p:sp>
+      <p:sp>
+        <p:nvSpPr>
+          <p:cNvPr id="47" name="TextBox 46">
+            <a:extLst>
+              <a:ext uri="{FF2B5EF4-FFF2-40B4-BE49-F238E27FC236}">
+                <a16:creationId xmlns:a16="http://schemas.microsoft.com/office/drawing/2014/main" id="{A4D36E49-32DA-4F3A-A09A-FF85F1F10F50}"/>
+              </a:ext>
+            </a:extLst>
+          </p:cNvPr>
+          <p:cNvSpPr txBox="1"/>
+          <p:nvPr/>
+        </p:nvSpPr>
+        <p:spPr>
+          <a:xfrm>
+            <a:off x="9180357" y="710556"/>
+            <a:ext cx="2751590" cy="646331"/>
+          </a:xfrm>
+          <a:prstGeom prst="rect">
+            <a:avLst/>
+          </a:prstGeom>
+          <a:noFill/>
+        </p:spPr>
+        <p:txBody>
+          <a:bodyPr wrap="square" rtlCol="0">
+            <a:spAutoFit/>
+          </a:bodyPr>
+          <a:lstStyle/>
+          <a:p>
+            <a:pPr algn="ctr"/>
+            <a:r>
+              <a:rPr lang="en-US" sz="3600" dirty="0"/>
+              <a:t>Prod</a:t>
+            </a:r>
+          </a:p>
+        </p:txBody>
+      </p:sp>
+      <p:sp>
+        <p:nvSpPr>
+          <p:cNvPr id="48" name="TextBox 47">
+            <a:extLst>
+              <a:ext uri="{FF2B5EF4-FFF2-40B4-BE49-F238E27FC236}">
+                <a16:creationId xmlns:a16="http://schemas.microsoft.com/office/drawing/2014/main" id="{E7B8C68B-70BB-4651-A97C-A2F3E3194F0A}"/>
+              </a:ext>
+            </a:extLst>
+          </p:cNvPr>
+          <p:cNvSpPr txBox="1"/>
+          <p:nvPr/>
+        </p:nvSpPr>
+        <p:spPr>
+          <a:xfrm>
+            <a:off x="550873" y="1151866"/>
+            <a:ext cx="2751590" cy="646331"/>
+          </a:xfrm>
+          <a:prstGeom prst="rect">
+            <a:avLst/>
+          </a:prstGeom>
+          <a:noFill/>
+        </p:spPr>
+        <p:txBody>
+          <a:bodyPr wrap="square" rtlCol="0">
+            <a:spAutoFit/>
+          </a:bodyPr>
+          <a:lstStyle/>
+          <a:p>
+            <a:pPr algn="ctr"/>
+            <a:r>
+              <a:rPr lang="en-US" dirty="0"/>
+              <a:t>Minimal tests to ensure connectivity.</a:t>
+            </a:r>
+          </a:p>
+        </p:txBody>
+      </p:sp>
+      <p:sp>
+        <p:nvSpPr>
+          <p:cNvPr id="49" name="TextBox 48">
+            <a:extLst>
+              <a:ext uri="{FF2B5EF4-FFF2-40B4-BE49-F238E27FC236}">
+                <a16:creationId xmlns:a16="http://schemas.microsoft.com/office/drawing/2014/main" id="{4CA122C4-F2CA-4703-BEDA-9E48582D14C6}"/>
+              </a:ext>
+            </a:extLst>
+          </p:cNvPr>
+          <p:cNvSpPr txBox="1"/>
+          <p:nvPr/>
+        </p:nvSpPr>
+        <p:spPr>
+          <a:xfrm>
+            <a:off x="4267200" y="1171578"/>
+            <a:ext cx="2751590" cy="646331"/>
+          </a:xfrm>
+          <a:prstGeom prst="rect">
+            <a:avLst/>
+          </a:prstGeom>
+          <a:noFill/>
+        </p:spPr>
+        <p:txBody>
+          <a:bodyPr wrap="square" rtlCol="0">
+            <a:spAutoFit/>
+          </a:bodyPr>
+          <a:lstStyle/>
+          <a:p>
+            <a:pPr algn="ctr"/>
+            <a:r>
+              <a:rPr lang="en-US" dirty="0"/>
+              <a:t>Robust tests to ensure quality.</a:t>
+            </a:r>
+          </a:p>
+        </p:txBody>
+      </p:sp>
+      <p:sp>
+        <p:nvSpPr>
+          <p:cNvPr id="50" name="TextBox 49">
+            <a:extLst>
+              <a:ext uri="{FF2B5EF4-FFF2-40B4-BE49-F238E27FC236}">
+                <a16:creationId xmlns:a16="http://schemas.microsoft.com/office/drawing/2014/main" id="{4AA14186-7262-4D46-94BB-4D64FDBD70A9}"/>
+              </a:ext>
+            </a:extLst>
+          </p:cNvPr>
+          <p:cNvSpPr txBox="1"/>
+          <p:nvPr/>
+        </p:nvSpPr>
+        <p:spPr>
+          <a:xfrm>
+            <a:off x="9169165" y="1171578"/>
+            <a:ext cx="2751590" cy="646331"/>
+          </a:xfrm>
+          <a:prstGeom prst="rect">
+            <a:avLst/>
+          </a:prstGeom>
+          <a:noFill/>
+        </p:spPr>
+        <p:txBody>
+          <a:bodyPr wrap="square" rtlCol="0">
+            <a:spAutoFit/>
+          </a:bodyPr>
+          <a:lstStyle/>
+          <a:p>
+            <a:pPr algn="ctr"/>
+            <a:r>
+              <a:rPr lang="en-US" dirty="0"/>
+              <a:t>Minimal tests to ensure connectivity.</a:t>
+            </a:r>
+          </a:p>
+        </p:txBody>
+      </p:sp>
+      <p:sp>
+        <p:nvSpPr>
+          <p:cNvPr id="31" name="TextBox 30">
+            <a:extLst>
+              <a:ext uri="{FF2B5EF4-FFF2-40B4-BE49-F238E27FC236}">
+                <a16:creationId xmlns:a16="http://schemas.microsoft.com/office/drawing/2014/main" id="{C302D169-5F79-451F-9777-08003BF20E06}"/>
+              </a:ext>
+            </a:extLst>
+          </p:cNvPr>
+          <p:cNvSpPr txBox="1"/>
+          <p:nvPr/>
+        </p:nvSpPr>
+        <p:spPr>
+          <a:xfrm>
+            <a:off x="5023784" y="3658167"/>
+            <a:ext cx="1402006" cy="369332"/>
+          </a:xfrm>
+          <a:prstGeom prst="rect">
+            <a:avLst/>
+          </a:prstGeom>
+          <a:solidFill>
+            <a:schemeClr val="accent2">
+              <a:lumMod val="40000"/>
+              <a:lumOff val="60000"/>
+            </a:schemeClr>
+          </a:solidFill>
+        </p:spPr>
+        <p:txBody>
+          <a:bodyPr wrap="square" rtlCol="0">
+            <a:spAutoFit/>
+          </a:bodyPr>
+          <a:lstStyle/>
+          <a:p>
+            <a:r>
+              <a:rPr lang="en-US" dirty="0"/>
+              <a:t>Smoke tests</a:t>
+            </a:r>
+          </a:p>
+        </p:txBody>
+      </p:sp>
+      <p:sp>
+        <p:nvSpPr>
+          <p:cNvPr id="32" name="TextBox 31">
+            <a:extLst>
+              <a:ext uri="{FF2B5EF4-FFF2-40B4-BE49-F238E27FC236}">
+                <a16:creationId xmlns:a16="http://schemas.microsoft.com/office/drawing/2014/main" id="{534A92F8-DB53-44DA-A358-C14DEA1F765D}"/>
+              </a:ext>
+            </a:extLst>
+          </p:cNvPr>
+          <p:cNvSpPr txBox="1"/>
+          <p:nvPr/>
+        </p:nvSpPr>
+        <p:spPr>
+          <a:xfrm>
+            <a:off x="1194130" y="3658167"/>
+            <a:ext cx="1431524" cy="369332"/>
+          </a:xfrm>
+          <a:prstGeom prst="rect">
+            <a:avLst/>
+          </a:prstGeom>
+          <a:solidFill>
+            <a:schemeClr val="accent2">
+              <a:lumMod val="40000"/>
+              <a:lumOff val="60000"/>
+            </a:schemeClr>
+          </a:solidFill>
+        </p:spPr>
+        <p:txBody>
+          <a:bodyPr wrap="square" rtlCol="0">
+            <a:spAutoFit/>
+          </a:bodyPr>
+          <a:lstStyle/>
+          <a:p>
+            <a:r>
+              <a:rPr lang="en-US" dirty="0"/>
+              <a:t>Smoke tests</a:t>
+            </a:r>
+          </a:p>
+        </p:txBody>
+      </p:sp>
+      <p:sp>
+        <p:nvSpPr>
+          <p:cNvPr id="36" name="Rectangle 35">
+            <a:extLst>
+              <a:ext uri="{FF2B5EF4-FFF2-40B4-BE49-F238E27FC236}">
+                <a16:creationId xmlns:a16="http://schemas.microsoft.com/office/drawing/2014/main" id="{B54BDD2E-396A-4FA4-A886-7BFA273C7722}"/>
+              </a:ext>
+            </a:extLst>
+          </p:cNvPr>
+          <p:cNvSpPr/>
+          <p:nvPr/>
+        </p:nvSpPr>
+        <p:spPr>
+          <a:xfrm>
+            <a:off x="534097" y="5253632"/>
+            <a:ext cx="2751590" cy="807710"/>
+          </a:xfrm>
+          <a:prstGeom prst="rect">
+            <a:avLst/>
+          </a:prstGeom>
+        </p:spPr>
+        <p:style>
+          <a:lnRef idx="2">
+            <a:schemeClr val="accent1">
+              <a:shade val="50000"/>
+            </a:schemeClr>
+          </a:lnRef>
+          <a:fillRef idx="1">
+            <a:schemeClr val="accent1"/>
+          </a:fillRef>
+          <a:effectRef idx="0">
+            <a:schemeClr val="accent1"/>
+          </a:effectRef>
+          <a:fontRef idx="minor">
+            <a:schemeClr val="lt1"/>
+          </a:fontRef>
+        </p:style>
+        <p:txBody>
+          <a:bodyPr rtlCol="0" anchor="ctr"/>
+          <a:lstStyle/>
+          <a:p>
+            <a:pPr algn="ctr"/>
+            <a:endParaRPr lang="en-US"/>
+          </a:p>
+        </p:txBody>
+      </p:sp>
+      <p:sp>
+        <p:nvSpPr>
+          <p:cNvPr id="37" name="TextBox 36">
+            <a:extLst>
+              <a:ext uri="{FF2B5EF4-FFF2-40B4-BE49-F238E27FC236}">
+                <a16:creationId xmlns:a16="http://schemas.microsoft.com/office/drawing/2014/main" id="{31289C89-F65D-457E-88CD-23818682A43C}"/>
+              </a:ext>
+            </a:extLst>
+          </p:cNvPr>
+          <p:cNvSpPr txBox="1"/>
+          <p:nvPr/>
+        </p:nvSpPr>
+        <p:spPr>
+          <a:xfrm>
+            <a:off x="492339" y="5207465"/>
+            <a:ext cx="1905346" cy="369332"/>
+          </a:xfrm>
+          <a:prstGeom prst="rect">
+            <a:avLst/>
+          </a:prstGeom>
+          <a:noFill/>
+        </p:spPr>
+        <p:txBody>
+          <a:bodyPr wrap="square" rtlCol="0">
+            <a:spAutoFit/>
+          </a:bodyPr>
+          <a:lstStyle/>
+          <a:p>
+            <a:r>
+              <a:rPr lang="en-US" dirty="0"/>
+              <a:t>Deploy to dev</a:t>
+            </a:r>
+          </a:p>
+        </p:txBody>
+      </p:sp>
+      <p:sp>
+        <p:nvSpPr>
+          <p:cNvPr id="38" name="Rectangle 37">
+            <a:extLst>
+              <a:ext uri="{FF2B5EF4-FFF2-40B4-BE49-F238E27FC236}">
+                <a16:creationId xmlns:a16="http://schemas.microsoft.com/office/drawing/2014/main" id="{F7809807-6C1B-40FB-A5C4-0EDB810F70CF}"/>
+              </a:ext>
+            </a:extLst>
+          </p:cNvPr>
+          <p:cNvSpPr/>
+          <p:nvPr/>
+        </p:nvSpPr>
+        <p:spPr>
+          <a:xfrm>
+            <a:off x="4267200" y="5253632"/>
+            <a:ext cx="2915174" cy="807710"/>
+          </a:xfrm>
+          <a:prstGeom prst="rect">
+            <a:avLst/>
+          </a:prstGeom>
+        </p:spPr>
+        <p:style>
+          <a:lnRef idx="2">
+            <a:schemeClr val="accent1">
+              <a:shade val="50000"/>
+            </a:schemeClr>
+          </a:lnRef>
+          <a:fillRef idx="1">
+            <a:schemeClr val="accent1"/>
+          </a:fillRef>
+          <a:effectRef idx="0">
+            <a:schemeClr val="accent1"/>
+          </a:effectRef>
+          <a:fontRef idx="minor">
+            <a:schemeClr val="lt1"/>
+          </a:fontRef>
+        </p:style>
+        <p:txBody>
+          <a:bodyPr rtlCol="0" anchor="ctr"/>
+          <a:lstStyle/>
+          <a:p>
+            <a:pPr algn="ctr"/>
+            <a:endParaRPr lang="en-US"/>
+          </a:p>
+        </p:txBody>
+      </p:sp>
+      <p:sp>
+        <p:nvSpPr>
+          <p:cNvPr id="39" name="TextBox 38">
+            <a:extLst>
+              <a:ext uri="{FF2B5EF4-FFF2-40B4-BE49-F238E27FC236}">
+                <a16:creationId xmlns:a16="http://schemas.microsoft.com/office/drawing/2014/main" id="{9657741D-0ED1-446C-9501-2D737ECC99A8}"/>
+              </a:ext>
+            </a:extLst>
+          </p:cNvPr>
+          <p:cNvSpPr txBox="1"/>
+          <p:nvPr/>
+        </p:nvSpPr>
+        <p:spPr>
+          <a:xfrm>
+            <a:off x="4267200" y="5269359"/>
+            <a:ext cx="1905346" cy="369332"/>
+          </a:xfrm>
+          <a:prstGeom prst="rect">
+            <a:avLst/>
+          </a:prstGeom>
+          <a:noFill/>
+        </p:spPr>
+        <p:txBody>
+          <a:bodyPr wrap="square" rtlCol="0">
+            <a:spAutoFit/>
+          </a:bodyPr>
+          <a:lstStyle/>
+          <a:p>
+            <a:r>
+              <a:rPr lang="en-US" dirty="0"/>
+              <a:t>Deploy to </a:t>
+            </a:r>
+            <a:r>
+              <a:rPr lang="en-US" dirty="0" err="1"/>
+              <a:t>qa</a:t>
+            </a:r>
+            <a:r>
+              <a:rPr lang="en-US" dirty="0"/>
+              <a:t> / </a:t>
+            </a:r>
+            <a:r>
+              <a:rPr lang="en-US" dirty="0" err="1"/>
+              <a:t>uat</a:t>
+            </a:r>
+            <a:endParaRPr lang="en-US" dirty="0"/>
+          </a:p>
+        </p:txBody>
+      </p:sp>
+      <p:sp>
+        <p:nvSpPr>
+          <p:cNvPr id="41" name="Rectangle 40">
+            <a:extLst>
+              <a:ext uri="{FF2B5EF4-FFF2-40B4-BE49-F238E27FC236}">
+                <a16:creationId xmlns:a16="http://schemas.microsoft.com/office/drawing/2014/main" id="{6346E6F0-9ECD-4392-8D61-2CBB2F136F1E}"/>
+              </a:ext>
+            </a:extLst>
+          </p:cNvPr>
+          <p:cNvSpPr/>
+          <p:nvPr/>
+        </p:nvSpPr>
+        <p:spPr>
+          <a:xfrm>
+            <a:off x="9163573" y="5253632"/>
+            <a:ext cx="2751590" cy="807710"/>
+          </a:xfrm>
+          <a:prstGeom prst="rect">
+            <a:avLst/>
+          </a:prstGeom>
+        </p:spPr>
+        <p:style>
+          <a:lnRef idx="2">
+            <a:schemeClr val="accent1">
+              <a:shade val="50000"/>
+            </a:schemeClr>
+          </a:lnRef>
+          <a:fillRef idx="1">
+            <a:schemeClr val="accent1"/>
+          </a:fillRef>
+          <a:effectRef idx="0">
+            <a:schemeClr val="accent1"/>
+          </a:effectRef>
+          <a:fontRef idx="minor">
+            <a:schemeClr val="lt1"/>
+          </a:fontRef>
+        </p:style>
+        <p:txBody>
+          <a:bodyPr rtlCol="0" anchor="ctr"/>
+          <a:lstStyle/>
+          <a:p>
+            <a:pPr algn="ctr"/>
+            <a:endParaRPr lang="en-US"/>
+          </a:p>
+        </p:txBody>
+      </p:sp>
+      <p:sp>
+        <p:nvSpPr>
+          <p:cNvPr id="43" name="TextBox 42">
+            <a:extLst>
+              <a:ext uri="{FF2B5EF4-FFF2-40B4-BE49-F238E27FC236}">
+                <a16:creationId xmlns:a16="http://schemas.microsoft.com/office/drawing/2014/main" id="{D98D0C68-7796-4A67-8CC0-8339EF9D5294}"/>
+              </a:ext>
+            </a:extLst>
+          </p:cNvPr>
+          <p:cNvSpPr txBox="1"/>
+          <p:nvPr/>
+        </p:nvSpPr>
+        <p:spPr>
+          <a:xfrm>
+            <a:off x="9113424" y="5269359"/>
+            <a:ext cx="1905346" cy="369332"/>
+          </a:xfrm>
+          <a:prstGeom prst="rect">
+            <a:avLst/>
+          </a:prstGeom>
+          <a:noFill/>
+        </p:spPr>
+        <p:txBody>
+          <a:bodyPr wrap="square" rtlCol="0">
+            <a:spAutoFit/>
+          </a:bodyPr>
+          <a:lstStyle/>
+          <a:p>
+            <a:r>
+              <a:rPr lang="en-US" dirty="0"/>
+              <a:t>Deploy to prod</a:t>
+            </a:r>
+          </a:p>
+        </p:txBody>
+      </p:sp>
+      <p:cxnSp>
+        <p:nvCxnSpPr>
+          <p:cNvPr id="51" name="Straight Arrow Connector 50">
+            <a:extLst>
+              <a:ext uri="{FF2B5EF4-FFF2-40B4-BE49-F238E27FC236}">
+                <a16:creationId xmlns:a16="http://schemas.microsoft.com/office/drawing/2014/main" id="{FAEAA835-2361-48C2-8CC7-8766BE279359}"/>
+              </a:ext>
+            </a:extLst>
+          </p:cNvPr>
+          <p:cNvCxnSpPr>
+            <a:cxnSpLocks/>
+          </p:cNvCxnSpPr>
+          <p:nvPr/>
+        </p:nvCxnSpPr>
+        <p:spPr>
+          <a:xfrm>
+            <a:off x="1909892" y="4721587"/>
+            <a:ext cx="0" cy="532045"/>
+          </a:xfrm>
+          <a:prstGeom prst="straightConnector1">
+            <a:avLst/>
+          </a:prstGeom>
+          <a:ln w="19050">
+            <a:solidFill>
+              <a:srgbClr val="FF0000"/>
+            </a:solidFill>
+            <a:prstDash val="dash"/>
+            <a:tailEnd type="triangle"/>
+          </a:ln>
+        </p:spPr>
+        <p:style>
+          <a:lnRef idx="3">
+            <a:schemeClr val="accent2"/>
+          </a:lnRef>
+          <a:fillRef idx="0">
+            <a:schemeClr val="accent2"/>
+          </a:fillRef>
+          <a:effectRef idx="2">
+            <a:schemeClr val="accent2"/>
+          </a:effectRef>
+          <a:fontRef idx="minor">
+            <a:schemeClr val="tx1"/>
+          </a:fontRef>
+        </p:style>
+      </p:cxnSp>
+      <p:cxnSp>
+        <p:nvCxnSpPr>
+          <p:cNvPr id="53" name="Straight Arrow Connector 52">
+            <a:extLst>
+              <a:ext uri="{FF2B5EF4-FFF2-40B4-BE49-F238E27FC236}">
+                <a16:creationId xmlns:a16="http://schemas.microsoft.com/office/drawing/2014/main" id="{0580C1EA-DAE7-49C9-95F8-BF32D2383033}"/>
+              </a:ext>
+            </a:extLst>
+          </p:cNvPr>
+          <p:cNvCxnSpPr>
+            <a:cxnSpLocks/>
+          </p:cNvCxnSpPr>
+          <p:nvPr/>
+        </p:nvCxnSpPr>
+        <p:spPr>
+          <a:xfrm>
+            <a:off x="5724787" y="4721587"/>
+            <a:ext cx="0" cy="532045"/>
+          </a:xfrm>
+          <a:prstGeom prst="straightConnector1">
+            <a:avLst/>
+          </a:prstGeom>
+          <a:ln w="19050">
+            <a:solidFill>
+              <a:srgbClr val="FF0000"/>
+            </a:solidFill>
+            <a:prstDash val="dash"/>
+            <a:tailEnd type="triangle"/>
+          </a:ln>
+        </p:spPr>
+        <p:style>
+          <a:lnRef idx="3">
+            <a:schemeClr val="accent2"/>
+          </a:lnRef>
+          <a:fillRef idx="0">
+            <a:schemeClr val="accent2"/>
+          </a:fillRef>
+          <a:effectRef idx="2">
+            <a:schemeClr val="accent2"/>
+          </a:effectRef>
+          <a:fontRef idx="minor">
+            <a:schemeClr val="tx1"/>
+          </a:fontRef>
+        </p:style>
+      </p:cxnSp>
+      <p:cxnSp>
+        <p:nvCxnSpPr>
+          <p:cNvPr id="54" name="Straight Arrow Connector 53">
+            <a:extLst>
+              <a:ext uri="{FF2B5EF4-FFF2-40B4-BE49-F238E27FC236}">
+                <a16:creationId xmlns:a16="http://schemas.microsoft.com/office/drawing/2014/main" id="{A08D732A-CCB2-4EB4-8263-BCC7C038A0B2}"/>
+              </a:ext>
+            </a:extLst>
+          </p:cNvPr>
+          <p:cNvCxnSpPr>
+            <a:cxnSpLocks/>
+          </p:cNvCxnSpPr>
+          <p:nvPr/>
+        </p:nvCxnSpPr>
+        <p:spPr>
+          <a:xfrm>
+            <a:off x="10563720" y="4721587"/>
+            <a:ext cx="0" cy="532045"/>
+          </a:xfrm>
+          <a:prstGeom prst="straightConnector1">
+            <a:avLst/>
+          </a:prstGeom>
+          <a:ln w="19050">
+            <a:solidFill>
+              <a:srgbClr val="FF0000"/>
+            </a:solidFill>
+            <a:prstDash val="dash"/>
+            <a:tailEnd type="triangle"/>
+          </a:ln>
+        </p:spPr>
+        <p:style>
+          <a:lnRef idx="3">
+            <a:schemeClr val="accent2"/>
+          </a:lnRef>
+          <a:fillRef idx="0">
+            <a:schemeClr val="accent2"/>
+          </a:fillRef>
+          <a:effectRef idx="2">
+            <a:schemeClr val="accent2"/>
+          </a:effectRef>
+          <a:fontRef idx="minor">
+            <a:schemeClr val="tx1"/>
+          </a:fontRef>
+        </p:style>
+      </p:cxnSp>
+      <p:sp>
+        <p:nvSpPr>
+          <p:cNvPr id="55" name="TextBox 54">
+            <a:extLst>
+              <a:ext uri="{FF2B5EF4-FFF2-40B4-BE49-F238E27FC236}">
+                <a16:creationId xmlns:a16="http://schemas.microsoft.com/office/drawing/2014/main" id="{ED390C73-A443-4CBB-A82D-766CB42E946E}"/>
+              </a:ext>
+            </a:extLst>
+          </p:cNvPr>
+          <p:cNvSpPr txBox="1"/>
+          <p:nvPr/>
+        </p:nvSpPr>
+        <p:spPr>
+          <a:xfrm>
+            <a:off x="1194130" y="5636075"/>
+            <a:ext cx="1431524" cy="369332"/>
+          </a:xfrm>
+          <a:prstGeom prst="rect">
+            <a:avLst/>
+          </a:prstGeom>
+          <a:solidFill>
+            <a:schemeClr val="accent2">
+              <a:lumMod val="40000"/>
+              <a:lumOff val="60000"/>
+            </a:schemeClr>
+          </a:solidFill>
+        </p:spPr>
+        <p:txBody>
+          <a:bodyPr wrap="square" rtlCol="0">
+            <a:spAutoFit/>
+          </a:bodyPr>
+          <a:lstStyle/>
+          <a:p>
+            <a:r>
+              <a:rPr lang="en-US" dirty="0"/>
+              <a:t>Smoke tests</a:t>
+            </a:r>
+          </a:p>
+        </p:txBody>
+      </p:sp>
+      <p:sp>
+        <p:nvSpPr>
+          <p:cNvPr id="56" name="TextBox 55">
+            <a:extLst>
+              <a:ext uri="{FF2B5EF4-FFF2-40B4-BE49-F238E27FC236}">
+                <a16:creationId xmlns:a16="http://schemas.microsoft.com/office/drawing/2014/main" id="{E439786C-69EF-45F7-9DBB-04D57FF52A2B}"/>
+              </a:ext>
+            </a:extLst>
+          </p:cNvPr>
+          <p:cNvSpPr txBox="1"/>
+          <p:nvPr/>
+        </p:nvSpPr>
+        <p:spPr>
+          <a:xfrm>
+            <a:off x="5009025" y="5636075"/>
+            <a:ext cx="1431524" cy="369332"/>
+          </a:xfrm>
+          <a:prstGeom prst="rect">
+            <a:avLst/>
+          </a:prstGeom>
+          <a:solidFill>
+            <a:schemeClr val="accent2">
+              <a:lumMod val="40000"/>
+              <a:lumOff val="60000"/>
+            </a:schemeClr>
+          </a:solidFill>
+        </p:spPr>
+        <p:txBody>
+          <a:bodyPr wrap="square" rtlCol="0">
+            <a:spAutoFit/>
+          </a:bodyPr>
+          <a:lstStyle/>
+          <a:p>
+            <a:r>
+              <a:rPr lang="en-US" dirty="0"/>
+              <a:t>Smoke tests</a:t>
+            </a:r>
+          </a:p>
+        </p:txBody>
+      </p:sp>
+      <p:sp>
+        <p:nvSpPr>
+          <p:cNvPr id="57" name="TextBox 56">
+            <a:extLst>
+              <a:ext uri="{FF2B5EF4-FFF2-40B4-BE49-F238E27FC236}">
+                <a16:creationId xmlns:a16="http://schemas.microsoft.com/office/drawing/2014/main" id="{A89BF356-9525-4B21-AA58-58A0BF177761}"/>
+              </a:ext>
+            </a:extLst>
+          </p:cNvPr>
+          <p:cNvSpPr txBox="1"/>
+          <p:nvPr/>
+        </p:nvSpPr>
+        <p:spPr>
+          <a:xfrm>
+            <a:off x="9823606" y="5636075"/>
+            <a:ext cx="1431524" cy="369332"/>
+          </a:xfrm>
+          <a:prstGeom prst="rect">
+            <a:avLst/>
+          </a:prstGeom>
+          <a:solidFill>
+            <a:schemeClr val="accent2">
+              <a:lumMod val="40000"/>
+              <a:lumOff val="60000"/>
+            </a:schemeClr>
+          </a:solidFill>
+        </p:spPr>
+        <p:txBody>
+          <a:bodyPr wrap="square" rtlCol="0">
+            <a:spAutoFit/>
+          </a:bodyPr>
+          <a:lstStyle/>
+          <a:p>
+            <a:r>
+              <a:rPr lang="en-US" dirty="0"/>
+              <a:t>Smoke tests</a:t>
+            </a:r>
+          </a:p>
+        </p:txBody>
+      </p:sp>
+      <p:cxnSp>
+        <p:nvCxnSpPr>
+          <p:cNvPr id="27" name="Straight Connector 26">
+            <a:extLst>
+              <a:ext uri="{FF2B5EF4-FFF2-40B4-BE49-F238E27FC236}">
+                <a16:creationId xmlns:a16="http://schemas.microsoft.com/office/drawing/2014/main" id="{A203DB08-118C-42CE-A237-1C67CB57D63D}"/>
+              </a:ext>
+            </a:extLst>
+          </p:cNvPr>
+          <p:cNvCxnSpPr>
+            <a:stCxn id="4" idx="1"/>
+            <a:endCxn id="4" idx="3"/>
+          </p:cNvCxnSpPr>
+          <p:nvPr/>
+        </p:nvCxnSpPr>
+        <p:spPr>
+          <a:xfrm>
+            <a:off x="534097" y="3383576"/>
+            <a:ext cx="2751590" cy="0"/>
+          </a:xfrm>
+          <a:prstGeom prst="line">
+            <a:avLst/>
+          </a:prstGeom>
+        </p:spPr>
+        <p:style>
+          <a:lnRef idx="1">
+            <a:schemeClr val="dk1"/>
+          </a:lnRef>
+          <a:fillRef idx="0">
+            <a:schemeClr val="dk1"/>
+          </a:fillRef>
+          <a:effectRef idx="0">
+            <a:schemeClr val="dk1"/>
+          </a:effectRef>
+          <a:fontRef idx="minor">
+            <a:schemeClr val="tx1"/>
+          </a:fontRef>
+        </p:style>
+      </p:cxnSp>
+      <p:sp>
+        <p:nvSpPr>
+          <p:cNvPr id="58" name="TextBox 57">
+            <a:extLst>
+              <a:ext uri="{FF2B5EF4-FFF2-40B4-BE49-F238E27FC236}">
+                <a16:creationId xmlns:a16="http://schemas.microsoft.com/office/drawing/2014/main" id="{19F182B0-6AEF-41E4-8794-E0C0CE947738}"/>
+              </a:ext>
+            </a:extLst>
+          </p:cNvPr>
+          <p:cNvSpPr txBox="1"/>
+          <p:nvPr/>
+        </p:nvSpPr>
+        <p:spPr>
+          <a:xfrm>
+            <a:off x="492339" y="2030209"/>
+            <a:ext cx="1905346" cy="369332"/>
+          </a:xfrm>
+          <a:prstGeom prst="rect">
+            <a:avLst/>
+          </a:prstGeom>
+          <a:noFill/>
+        </p:spPr>
+        <p:txBody>
+          <a:bodyPr wrap="square" rtlCol="0">
+            <a:spAutoFit/>
+          </a:bodyPr>
+          <a:lstStyle/>
+          <a:p>
+            <a:r>
+              <a:rPr lang="en-US" dirty="0"/>
+              <a:t>Pre-Deployment</a:t>
+            </a:r>
+          </a:p>
+        </p:txBody>
+      </p:sp>
+    </p:spTree>
+    <p:extLst>
+      <p:ext uri="{BB962C8B-B14F-4D97-AF65-F5344CB8AC3E}">
+        <p14:creationId xmlns:p14="http://schemas.microsoft.com/office/powerpoint/2010/main" val="218559825"/>
+      </p:ext>
+    </p:extLst>
+  </p:cSld>
+  <p:clrMapOvr>
+    <a:masterClrMapping/>
+  </p:clrMapOvr>
+</p:sld>
+</file>
+
+<file path=ppt/slides/slide4.xml><?xml version="1.0" encoding="utf-8"?>
+<p:sld xmlns:a="http://schemas.openxmlformats.org/drawingml/2006/main" xmlns:r="http://schemas.openxmlformats.org/officeDocument/2006/relationships" xmlns:p="http://schemas.openxmlformats.org/presentationml/2006/main">
+  <p:cSld>
+    <p:spTree>
+      <p:nvGrpSpPr>
+        <p:cNvPr id="1" name=""/>
+        <p:cNvGrpSpPr/>
+        <p:nvPr/>
+      </p:nvGrpSpPr>
+      <p:grpSpPr>
+        <a:xfrm>
+          <a:off x="0" y="0"/>
+          <a:ext cx="0" cy="0"/>
+          <a:chOff x="0" y="0"/>
+          <a:chExt cx="0" cy="0"/>
+        </a:xfrm>
+      </p:grpSpPr>
       <p:cxnSp>
         <p:nvCxnSpPr>
           <p:cNvPr id="5" name="Straight Connector 4">
@@ -6488,6 +7002,10 @@
             <a:br>
               <a:rPr lang="en-US" sz="1000" dirty="0"/>
             </a:br>
+            <a:r>
+              <a:rPr lang="en-US" sz="1000" dirty="0"/>
+              <a:t/>
+            </a:r>
             <a:br>
               <a:rPr lang="en-US" sz="1000" dirty="0"/>
             </a:br>
@@ -7282,6 +7800,14 @@
               </a:rPr>
               <a:t>What is return time when system has expected load.</a:t>
             </a:r>
+            <a:r>
+              <a:rPr lang="en-US" sz="1100" b="1" dirty="0">
+                <a:solidFill>
+                  <a:srgbClr val="FF0000"/>
+                </a:solidFill>
+              </a:rPr>
+              <a:t/>
+            </a:r>
             <a:br>
               <a:rPr lang="en-US" sz="1100" b="1" dirty="0">
                 <a:solidFill>
@@ -7769,7 +8295,7 @@
 </p:sld>
 </file>
 
-<file path=ppt/slides/slide4.xml><?xml version="1.0" encoding="utf-8"?>
+<file path=ppt/slides/slide5.xml><?xml version="1.0" encoding="utf-8"?>
 <p:sld xmlns:a="http://schemas.openxmlformats.org/drawingml/2006/main" xmlns:r="http://schemas.openxmlformats.org/officeDocument/2006/relationships" xmlns:p="http://schemas.openxmlformats.org/presentationml/2006/main">
   <p:cSld>
     <p:spTree>
@@ -8430,6 +8956,16 @@
                         </a:rPr>
                         <a:t>Whole Component</a:t>
                       </a:r>
+                      <a:r>
+                        <a:rPr lang="en-US" sz="1300" dirty="0">
+                          <a:solidFill>
+                            <a:schemeClr val="bg1">
+                              <a:lumMod val="65000"/>
+                            </a:schemeClr>
+                          </a:solidFill>
+                        </a:rPr>
+                        <a:t/>
+                      </a:r>
                       <a:br>
                         <a:rPr lang="en-US" sz="1300" dirty="0">
                           <a:solidFill>
@@ -8517,6 +9053,16 @@
                           </a:solidFill>
                         </a:rPr>
                         <a:t>Infrastructure</a:t>
+                      </a:r>
+                      <a:r>
+                        <a:rPr lang="en-US" sz="1300" dirty="0">
+                          <a:solidFill>
+                            <a:schemeClr val="bg1">
+                              <a:lumMod val="65000"/>
+                            </a:schemeClr>
+                          </a:solidFill>
+                        </a:rPr>
+                        <a:t/>
                       </a:r>
                       <a:br>
                         <a:rPr lang="en-US" sz="1300" dirty="0">
@@ -8624,6 +9170,16 @@
                           </a:solidFill>
                         </a:rPr>
                         <a:t>Repository Data</a:t>
+                      </a:r>
+                      <a:r>
+                        <a:rPr lang="en-US" sz="1300" dirty="0">
+                          <a:solidFill>
+                            <a:schemeClr val="bg1">
+                              <a:lumMod val="65000"/>
+                            </a:schemeClr>
+                          </a:solidFill>
+                        </a:rPr>
+                        <a:t/>
                       </a:r>
                       <a:br>
                         <a:rPr lang="en-US" sz="1300" dirty="0">

</xml_diff>